<commit_message>
adding partional image to folder
</commit_message>
<xml_diff>
--- a/501_final_pres/self_created_sketches.pptx
+++ b/501_final_pres/self_created_sketches.pptx
@@ -6,11 +6,12 @@
   </p:sldMasterIdLst>
   <p:sldIdLst>
     <p:sldId id="256" r:id="rId2"/>
-    <p:sldId id="257" r:id="rId3"/>
-    <p:sldId id="258" r:id="rId4"/>
-    <p:sldId id="262" r:id="rId5"/>
-    <p:sldId id="260" r:id="rId6"/>
-    <p:sldId id="261" r:id="rId7"/>
+    <p:sldId id="263" r:id="rId3"/>
+    <p:sldId id="257" r:id="rId4"/>
+    <p:sldId id="258" r:id="rId5"/>
+    <p:sldId id="262" r:id="rId6"/>
+    <p:sldId id="260" r:id="rId7"/>
+    <p:sldId id="261" r:id="rId8"/>
   </p:sldIdLst>
   <p:sldSz cx="12192000" cy="6858000"/>
   <p:notesSz cx="6858000" cy="9144000"/>
@@ -266,7 +267,7 @@
           <a:p>
             <a:fld id="{E7E43F73-75AA-C647-93DA-1F45EAB6F996}" type="datetimeFigureOut">
               <a:rPr lang="en-DE" smtClean="0"/>
-              <a:t>13.05.21</a:t>
+              <a:t>15.05.21</a:t>
             </a:fld>
             <a:endParaRPr lang="en-DE"/>
           </a:p>
@@ -466,7 +467,7 @@
           <a:p>
             <a:fld id="{E7E43F73-75AA-C647-93DA-1F45EAB6F996}" type="datetimeFigureOut">
               <a:rPr lang="en-DE" smtClean="0"/>
-              <a:t>13.05.21</a:t>
+              <a:t>15.05.21</a:t>
             </a:fld>
             <a:endParaRPr lang="en-DE"/>
           </a:p>
@@ -676,7 +677,7 @@
           <a:p>
             <a:fld id="{E7E43F73-75AA-C647-93DA-1F45EAB6F996}" type="datetimeFigureOut">
               <a:rPr lang="en-DE" smtClean="0"/>
-              <a:t>13.05.21</a:t>
+              <a:t>15.05.21</a:t>
             </a:fld>
             <a:endParaRPr lang="en-DE"/>
           </a:p>
@@ -876,7 +877,7 @@
           <a:p>
             <a:fld id="{E7E43F73-75AA-C647-93DA-1F45EAB6F996}" type="datetimeFigureOut">
               <a:rPr lang="en-DE" smtClean="0"/>
-              <a:t>13.05.21</a:t>
+              <a:t>15.05.21</a:t>
             </a:fld>
             <a:endParaRPr lang="en-DE"/>
           </a:p>
@@ -1152,7 +1153,7 @@
           <a:p>
             <a:fld id="{E7E43F73-75AA-C647-93DA-1F45EAB6F996}" type="datetimeFigureOut">
               <a:rPr lang="en-DE" smtClean="0"/>
-              <a:t>13.05.21</a:t>
+              <a:t>15.05.21</a:t>
             </a:fld>
             <a:endParaRPr lang="en-DE"/>
           </a:p>
@@ -1420,7 +1421,7 @@
           <a:p>
             <a:fld id="{E7E43F73-75AA-C647-93DA-1F45EAB6F996}" type="datetimeFigureOut">
               <a:rPr lang="en-DE" smtClean="0"/>
-              <a:t>13.05.21</a:t>
+              <a:t>15.05.21</a:t>
             </a:fld>
             <a:endParaRPr lang="en-DE"/>
           </a:p>
@@ -1835,7 +1836,7 @@
           <a:p>
             <a:fld id="{E7E43F73-75AA-C647-93DA-1F45EAB6F996}" type="datetimeFigureOut">
               <a:rPr lang="en-DE" smtClean="0"/>
-              <a:t>13.05.21</a:t>
+              <a:t>15.05.21</a:t>
             </a:fld>
             <a:endParaRPr lang="en-DE"/>
           </a:p>
@@ -1977,7 +1978,7 @@
           <a:p>
             <a:fld id="{E7E43F73-75AA-C647-93DA-1F45EAB6F996}" type="datetimeFigureOut">
               <a:rPr lang="en-DE" smtClean="0"/>
-              <a:t>13.05.21</a:t>
+              <a:t>15.05.21</a:t>
             </a:fld>
             <a:endParaRPr lang="en-DE"/>
           </a:p>
@@ -2090,7 +2091,7 @@
           <a:p>
             <a:fld id="{E7E43F73-75AA-C647-93DA-1F45EAB6F996}" type="datetimeFigureOut">
               <a:rPr lang="en-DE" smtClean="0"/>
-              <a:t>13.05.21</a:t>
+              <a:t>15.05.21</a:t>
             </a:fld>
             <a:endParaRPr lang="en-DE"/>
           </a:p>
@@ -2403,7 +2404,7 @@
           <a:p>
             <a:fld id="{E7E43F73-75AA-C647-93DA-1F45EAB6F996}" type="datetimeFigureOut">
               <a:rPr lang="en-DE" smtClean="0"/>
-              <a:t>13.05.21</a:t>
+              <a:t>15.05.21</a:t>
             </a:fld>
             <a:endParaRPr lang="en-DE"/>
           </a:p>
@@ -2692,7 +2693,7 @@
           <a:p>
             <a:fld id="{E7E43F73-75AA-C647-93DA-1F45EAB6F996}" type="datetimeFigureOut">
               <a:rPr lang="en-DE" smtClean="0"/>
-              <a:t>13.05.21</a:t>
+              <a:t>15.05.21</a:t>
             </a:fld>
             <a:endParaRPr lang="en-DE"/>
           </a:p>
@@ -2935,7 +2936,7 @@
           <a:p>
             <a:fld id="{E7E43F73-75AA-C647-93DA-1F45EAB6F996}" type="datetimeFigureOut">
               <a:rPr lang="en-DE" smtClean="0"/>
-              <a:t>13.05.21</a:t>
+              <a:t>15.05.21</a:t>
             </a:fld>
             <a:endParaRPr lang="en-DE"/>
           </a:p>
@@ -3416,6 +3417,1459 @@
 </file>
 
 <file path=ppt/slides/slide2.xml><?xml version="1.0" encoding="utf-8"?>
+<p:sld xmlns:a="http://schemas.openxmlformats.org/drawingml/2006/main" xmlns:r="http://schemas.openxmlformats.org/officeDocument/2006/relationships" xmlns:p="http://schemas.openxmlformats.org/presentationml/2006/main">
+  <p:cSld>
+    <p:spTree>
+      <p:nvGrpSpPr>
+        <p:cNvPr id="1" name=""/>
+        <p:cNvGrpSpPr/>
+        <p:nvPr/>
+      </p:nvGrpSpPr>
+      <p:grpSpPr>
+        <a:xfrm>
+          <a:off x="0" y="0"/>
+          <a:ext cx="0" cy="0"/>
+          <a:chOff x="0" y="0"/>
+          <a:chExt cx="0" cy="0"/>
+        </a:xfrm>
+      </p:grpSpPr>
+      <p:sp>
+        <p:nvSpPr>
+          <p:cNvPr id="2" name="Title 1">
+            <a:extLst>
+              <a:ext uri="{FF2B5EF4-FFF2-40B4-BE49-F238E27FC236}">
+                <a16:creationId xmlns:a16="http://schemas.microsoft.com/office/drawing/2014/main" id="{6379C675-9903-2E4A-BC8F-75098A2F93E7}"/>
+              </a:ext>
+            </a:extLst>
+          </p:cNvPr>
+          <p:cNvSpPr>
+            <a:spLocks noGrp="1"/>
+          </p:cNvSpPr>
+          <p:nvPr>
+            <p:ph type="title"/>
+          </p:nvPr>
+        </p:nvSpPr>
+        <p:spPr/>
+        <p:txBody>
+          <a:bodyPr/>
+          <a:lstStyle/>
+          <a:p>
+            <a:endParaRPr lang="en-DE" dirty="0"/>
+          </a:p>
+        </p:txBody>
+      </p:sp>
+      <p:cxnSp>
+        <p:nvCxnSpPr>
+          <p:cNvPr id="4" name="Straight Arrow Connector 3">
+            <a:extLst>
+              <a:ext uri="{FF2B5EF4-FFF2-40B4-BE49-F238E27FC236}">
+                <a16:creationId xmlns:a16="http://schemas.microsoft.com/office/drawing/2014/main" id="{08DEE83A-65C5-6C48-AE0B-71F3A1B211FA}"/>
+              </a:ext>
+            </a:extLst>
+          </p:cNvPr>
+          <p:cNvCxnSpPr>
+            <a:cxnSpLocks/>
+          </p:cNvCxnSpPr>
+          <p:nvPr/>
+        </p:nvCxnSpPr>
+        <p:spPr>
+          <a:xfrm>
+            <a:off x="4699763" y="4530636"/>
+            <a:ext cx="3070806" cy="0"/>
+          </a:xfrm>
+          <a:prstGeom prst="straightConnector1">
+            <a:avLst/>
+          </a:prstGeom>
+          <a:ln w="57150">
+            <a:tailEnd type="triangle"/>
+          </a:ln>
+        </p:spPr>
+        <p:style>
+          <a:lnRef idx="1">
+            <a:schemeClr val="accent1"/>
+          </a:lnRef>
+          <a:fillRef idx="0">
+            <a:schemeClr val="accent1"/>
+          </a:fillRef>
+          <a:effectRef idx="0">
+            <a:schemeClr val="accent1"/>
+          </a:effectRef>
+          <a:fontRef idx="minor">
+            <a:schemeClr val="tx1"/>
+          </a:fontRef>
+        </p:style>
+      </p:cxnSp>
+      <p:cxnSp>
+        <p:nvCxnSpPr>
+          <p:cNvPr id="5" name="Straight Arrow Connector 4">
+            <a:extLst>
+              <a:ext uri="{FF2B5EF4-FFF2-40B4-BE49-F238E27FC236}">
+                <a16:creationId xmlns:a16="http://schemas.microsoft.com/office/drawing/2014/main" id="{D54ED597-AF2E-6D46-B42B-F5FD55AFB31B}"/>
+              </a:ext>
+            </a:extLst>
+          </p:cNvPr>
+          <p:cNvCxnSpPr>
+            <a:cxnSpLocks/>
+          </p:cNvCxnSpPr>
+          <p:nvPr/>
+        </p:nvCxnSpPr>
+        <p:spPr>
+          <a:xfrm flipV="1">
+            <a:off x="4715866" y="3006547"/>
+            <a:ext cx="0" cy="1524089"/>
+          </a:xfrm>
+          <a:prstGeom prst="straightConnector1">
+            <a:avLst/>
+          </a:prstGeom>
+          <a:ln w="57150">
+            <a:tailEnd type="triangle"/>
+          </a:ln>
+        </p:spPr>
+        <p:style>
+          <a:lnRef idx="1">
+            <a:schemeClr val="accent1"/>
+          </a:lnRef>
+          <a:fillRef idx="0">
+            <a:schemeClr val="accent1"/>
+          </a:fillRef>
+          <a:effectRef idx="0">
+            <a:schemeClr val="accent1"/>
+          </a:effectRef>
+          <a:fontRef idx="minor">
+            <a:schemeClr val="tx1"/>
+          </a:fontRef>
+        </p:style>
+      </p:cxnSp>
+      <p:sp>
+        <p:nvSpPr>
+          <p:cNvPr id="8" name="Oval 7">
+            <a:extLst>
+              <a:ext uri="{FF2B5EF4-FFF2-40B4-BE49-F238E27FC236}">
+                <a16:creationId xmlns:a16="http://schemas.microsoft.com/office/drawing/2014/main" id="{4A85FB7B-7CF4-5C4D-8892-A3841DDE5B72}"/>
+              </a:ext>
+            </a:extLst>
+          </p:cNvPr>
+          <p:cNvSpPr/>
+          <p:nvPr/>
+        </p:nvSpPr>
+        <p:spPr>
+          <a:xfrm>
+            <a:off x="4957483" y="3429000"/>
+            <a:ext cx="134469" cy="147912"/>
+          </a:xfrm>
+          <a:prstGeom prst="ellipse">
+            <a:avLst/>
+          </a:prstGeom>
+          <a:solidFill>
+            <a:schemeClr val="accent1">
+              <a:lumMod val="50000"/>
+            </a:schemeClr>
+          </a:solidFill>
+          <a:ln>
+            <a:noFill/>
+          </a:ln>
+        </p:spPr>
+        <p:style>
+          <a:lnRef idx="2">
+            <a:schemeClr val="accent1">
+              <a:shade val="50000"/>
+            </a:schemeClr>
+          </a:lnRef>
+          <a:fillRef idx="1">
+            <a:schemeClr val="accent1"/>
+          </a:fillRef>
+          <a:effectRef idx="0">
+            <a:schemeClr val="accent1"/>
+          </a:effectRef>
+          <a:fontRef idx="minor">
+            <a:schemeClr val="lt1"/>
+          </a:fontRef>
+        </p:style>
+        <p:txBody>
+          <a:bodyPr rtlCol="0" anchor="ctr"/>
+          <a:lstStyle/>
+          <a:p>
+            <a:pPr algn="ctr"/>
+            <a:endParaRPr lang="en-DE"/>
+          </a:p>
+        </p:txBody>
+      </p:sp>
+      <p:sp>
+        <p:nvSpPr>
+          <p:cNvPr id="9" name="Oval 8">
+            <a:extLst>
+              <a:ext uri="{FF2B5EF4-FFF2-40B4-BE49-F238E27FC236}">
+                <a16:creationId xmlns:a16="http://schemas.microsoft.com/office/drawing/2014/main" id="{C38AAA38-DD78-3A42-A753-47B4EB565EAA}"/>
+              </a:ext>
+            </a:extLst>
+          </p:cNvPr>
+          <p:cNvSpPr/>
+          <p:nvPr/>
+        </p:nvSpPr>
+        <p:spPr>
+          <a:xfrm>
+            <a:off x="5084676" y="3249962"/>
+            <a:ext cx="134469" cy="147912"/>
+          </a:xfrm>
+          <a:prstGeom prst="ellipse">
+            <a:avLst/>
+          </a:prstGeom>
+          <a:solidFill>
+            <a:schemeClr val="accent1">
+              <a:lumMod val="50000"/>
+            </a:schemeClr>
+          </a:solidFill>
+          <a:ln>
+            <a:noFill/>
+          </a:ln>
+        </p:spPr>
+        <p:style>
+          <a:lnRef idx="2">
+            <a:schemeClr val="accent1">
+              <a:shade val="50000"/>
+            </a:schemeClr>
+          </a:lnRef>
+          <a:fillRef idx="1">
+            <a:schemeClr val="accent1"/>
+          </a:fillRef>
+          <a:effectRef idx="0">
+            <a:schemeClr val="accent1"/>
+          </a:effectRef>
+          <a:fontRef idx="minor">
+            <a:schemeClr val="lt1"/>
+          </a:fontRef>
+        </p:style>
+        <p:txBody>
+          <a:bodyPr rtlCol="0" anchor="ctr"/>
+          <a:lstStyle/>
+          <a:p>
+            <a:pPr algn="ctr"/>
+            <a:endParaRPr lang="en-DE"/>
+          </a:p>
+        </p:txBody>
+      </p:sp>
+      <p:sp>
+        <p:nvSpPr>
+          <p:cNvPr id="10" name="Oval 9">
+            <a:extLst>
+              <a:ext uri="{FF2B5EF4-FFF2-40B4-BE49-F238E27FC236}">
+                <a16:creationId xmlns:a16="http://schemas.microsoft.com/office/drawing/2014/main" id="{FFB4986B-6F82-BD4A-B28F-9EFBF0EEFA3C}"/>
+              </a:ext>
+            </a:extLst>
+          </p:cNvPr>
+          <p:cNvSpPr/>
+          <p:nvPr/>
+        </p:nvSpPr>
+        <p:spPr>
+          <a:xfrm>
+            <a:off x="5151910" y="3453650"/>
+            <a:ext cx="134469" cy="147912"/>
+          </a:xfrm>
+          <a:prstGeom prst="ellipse">
+            <a:avLst/>
+          </a:prstGeom>
+          <a:solidFill>
+            <a:schemeClr val="accent1">
+              <a:lumMod val="50000"/>
+            </a:schemeClr>
+          </a:solidFill>
+          <a:ln>
+            <a:noFill/>
+          </a:ln>
+        </p:spPr>
+        <p:style>
+          <a:lnRef idx="2">
+            <a:schemeClr val="accent1">
+              <a:shade val="50000"/>
+            </a:schemeClr>
+          </a:lnRef>
+          <a:fillRef idx="1">
+            <a:schemeClr val="accent1"/>
+          </a:fillRef>
+          <a:effectRef idx="0">
+            <a:schemeClr val="accent1"/>
+          </a:effectRef>
+          <a:fontRef idx="minor">
+            <a:schemeClr val="lt1"/>
+          </a:fontRef>
+        </p:style>
+        <p:txBody>
+          <a:bodyPr rtlCol="0" anchor="ctr"/>
+          <a:lstStyle/>
+          <a:p>
+            <a:pPr algn="ctr"/>
+            <a:endParaRPr lang="en-DE"/>
+          </a:p>
+        </p:txBody>
+      </p:sp>
+      <p:sp>
+        <p:nvSpPr>
+          <p:cNvPr id="11" name="Oval 10">
+            <a:extLst>
+              <a:ext uri="{FF2B5EF4-FFF2-40B4-BE49-F238E27FC236}">
+                <a16:creationId xmlns:a16="http://schemas.microsoft.com/office/drawing/2014/main" id="{9814E310-FABC-0E4E-9B80-AA8586950023}"/>
+              </a:ext>
+            </a:extLst>
+          </p:cNvPr>
+          <p:cNvSpPr/>
+          <p:nvPr/>
+        </p:nvSpPr>
+        <p:spPr>
+          <a:xfrm>
+            <a:off x="5346337" y="3484606"/>
+            <a:ext cx="134469" cy="147912"/>
+          </a:xfrm>
+          <a:prstGeom prst="ellipse">
+            <a:avLst/>
+          </a:prstGeom>
+          <a:solidFill>
+            <a:schemeClr val="accent1">
+              <a:lumMod val="50000"/>
+            </a:schemeClr>
+          </a:solidFill>
+          <a:ln>
+            <a:noFill/>
+          </a:ln>
+        </p:spPr>
+        <p:style>
+          <a:lnRef idx="2">
+            <a:schemeClr val="accent1">
+              <a:shade val="50000"/>
+            </a:schemeClr>
+          </a:lnRef>
+          <a:fillRef idx="1">
+            <a:schemeClr val="accent1"/>
+          </a:fillRef>
+          <a:effectRef idx="0">
+            <a:schemeClr val="accent1"/>
+          </a:effectRef>
+          <a:fontRef idx="minor">
+            <a:schemeClr val="lt1"/>
+          </a:fontRef>
+        </p:style>
+        <p:txBody>
+          <a:bodyPr rtlCol="0" anchor="ctr"/>
+          <a:lstStyle/>
+          <a:p>
+            <a:pPr algn="ctr"/>
+            <a:endParaRPr lang="en-DE"/>
+          </a:p>
+        </p:txBody>
+      </p:sp>
+      <p:sp>
+        <p:nvSpPr>
+          <p:cNvPr id="12" name="Oval 11">
+            <a:extLst>
+              <a:ext uri="{FF2B5EF4-FFF2-40B4-BE49-F238E27FC236}">
+                <a16:creationId xmlns:a16="http://schemas.microsoft.com/office/drawing/2014/main" id="{F876BDB5-F1BE-3D4B-A2BE-C4DBE852DDB3}"/>
+              </a:ext>
+            </a:extLst>
+          </p:cNvPr>
+          <p:cNvSpPr/>
+          <p:nvPr/>
+        </p:nvSpPr>
+        <p:spPr>
+          <a:xfrm>
+            <a:off x="5279103" y="3323918"/>
+            <a:ext cx="134469" cy="147912"/>
+          </a:xfrm>
+          <a:prstGeom prst="ellipse">
+            <a:avLst/>
+          </a:prstGeom>
+          <a:solidFill>
+            <a:schemeClr val="accent1">
+              <a:lumMod val="50000"/>
+            </a:schemeClr>
+          </a:solidFill>
+          <a:ln>
+            <a:noFill/>
+          </a:ln>
+        </p:spPr>
+        <p:style>
+          <a:lnRef idx="2">
+            <a:schemeClr val="accent1">
+              <a:shade val="50000"/>
+            </a:schemeClr>
+          </a:lnRef>
+          <a:fillRef idx="1">
+            <a:schemeClr val="accent1"/>
+          </a:fillRef>
+          <a:effectRef idx="0">
+            <a:schemeClr val="accent1"/>
+          </a:effectRef>
+          <a:fontRef idx="minor">
+            <a:schemeClr val="lt1"/>
+          </a:fontRef>
+        </p:style>
+        <p:txBody>
+          <a:bodyPr rtlCol="0" anchor="ctr"/>
+          <a:lstStyle/>
+          <a:p>
+            <a:pPr algn="ctr"/>
+            <a:endParaRPr lang="en-DE"/>
+          </a:p>
+        </p:txBody>
+      </p:sp>
+      <p:sp>
+        <p:nvSpPr>
+          <p:cNvPr id="13" name="Oval 12">
+            <a:extLst>
+              <a:ext uri="{FF2B5EF4-FFF2-40B4-BE49-F238E27FC236}">
+                <a16:creationId xmlns:a16="http://schemas.microsoft.com/office/drawing/2014/main" id="{00A6CBB4-0DAF-CF4E-B3B0-485883868155}"/>
+              </a:ext>
+            </a:extLst>
+          </p:cNvPr>
+          <p:cNvSpPr/>
+          <p:nvPr/>
+        </p:nvSpPr>
+        <p:spPr>
+          <a:xfrm>
+            <a:off x="4891404" y="3346080"/>
+            <a:ext cx="134469" cy="147912"/>
+          </a:xfrm>
+          <a:prstGeom prst="ellipse">
+            <a:avLst/>
+          </a:prstGeom>
+          <a:solidFill>
+            <a:schemeClr val="accent1">
+              <a:lumMod val="50000"/>
+            </a:schemeClr>
+          </a:solidFill>
+          <a:ln>
+            <a:noFill/>
+          </a:ln>
+        </p:spPr>
+        <p:style>
+          <a:lnRef idx="2">
+            <a:schemeClr val="accent1">
+              <a:shade val="50000"/>
+            </a:schemeClr>
+          </a:lnRef>
+          <a:fillRef idx="1">
+            <a:schemeClr val="accent1"/>
+          </a:fillRef>
+          <a:effectRef idx="0">
+            <a:schemeClr val="accent1"/>
+          </a:effectRef>
+          <a:fontRef idx="minor">
+            <a:schemeClr val="lt1"/>
+          </a:fontRef>
+        </p:style>
+        <p:txBody>
+          <a:bodyPr rtlCol="0" anchor="ctr"/>
+          <a:lstStyle/>
+          <a:p>
+            <a:pPr algn="ctr"/>
+            <a:endParaRPr lang="en-DE"/>
+          </a:p>
+        </p:txBody>
+      </p:sp>
+      <p:sp>
+        <p:nvSpPr>
+          <p:cNvPr id="14" name="Oval 13">
+            <a:extLst>
+              <a:ext uri="{FF2B5EF4-FFF2-40B4-BE49-F238E27FC236}">
+                <a16:creationId xmlns:a16="http://schemas.microsoft.com/office/drawing/2014/main" id="{441A16BB-4E4D-7940-A21B-4B4685BE020C}"/>
+              </a:ext>
+            </a:extLst>
+          </p:cNvPr>
+          <p:cNvSpPr/>
+          <p:nvPr/>
+        </p:nvSpPr>
+        <p:spPr>
+          <a:xfrm>
+            <a:off x="4812936" y="3187722"/>
+            <a:ext cx="753035" cy="556034"/>
+          </a:xfrm>
+          <a:prstGeom prst="ellipse">
+            <a:avLst/>
+          </a:prstGeom>
+          <a:noFill/>
+          <a:ln w="28575">
+            <a:solidFill>
+              <a:schemeClr val="tx1"/>
+            </a:solidFill>
+            <a:prstDash val="dash"/>
+          </a:ln>
+        </p:spPr>
+        <p:style>
+          <a:lnRef idx="2">
+            <a:schemeClr val="accent1">
+              <a:shade val="50000"/>
+            </a:schemeClr>
+          </a:lnRef>
+          <a:fillRef idx="1">
+            <a:schemeClr val="accent1"/>
+          </a:fillRef>
+          <a:effectRef idx="0">
+            <a:schemeClr val="accent1"/>
+          </a:effectRef>
+          <a:fontRef idx="minor">
+            <a:schemeClr val="lt1"/>
+          </a:fontRef>
+        </p:style>
+        <p:txBody>
+          <a:bodyPr rtlCol="0" anchor="ctr"/>
+          <a:lstStyle/>
+          <a:p>
+            <a:pPr algn="ctr"/>
+            <a:endParaRPr lang="en-DE"/>
+          </a:p>
+        </p:txBody>
+      </p:sp>
+      <p:sp>
+        <p:nvSpPr>
+          <p:cNvPr id="15" name="Oval 14">
+            <a:extLst>
+              <a:ext uri="{FF2B5EF4-FFF2-40B4-BE49-F238E27FC236}">
+                <a16:creationId xmlns:a16="http://schemas.microsoft.com/office/drawing/2014/main" id="{ADFAB04E-5DFF-B44D-834C-FA85EA5D30AD}"/>
+              </a:ext>
+            </a:extLst>
+          </p:cNvPr>
+          <p:cNvSpPr/>
+          <p:nvPr/>
+        </p:nvSpPr>
+        <p:spPr>
+          <a:xfrm>
+            <a:off x="5170898" y="3957709"/>
+            <a:ext cx="669197" cy="457577"/>
+          </a:xfrm>
+          <a:prstGeom prst="ellipse">
+            <a:avLst/>
+          </a:prstGeom>
+          <a:noFill/>
+          <a:ln w="28575">
+            <a:solidFill>
+              <a:schemeClr val="tx1"/>
+            </a:solidFill>
+            <a:prstDash val="dash"/>
+          </a:ln>
+        </p:spPr>
+        <p:style>
+          <a:lnRef idx="2">
+            <a:schemeClr val="accent1">
+              <a:shade val="50000"/>
+            </a:schemeClr>
+          </a:lnRef>
+          <a:fillRef idx="1">
+            <a:schemeClr val="accent1"/>
+          </a:fillRef>
+          <a:effectRef idx="0">
+            <a:schemeClr val="accent1"/>
+          </a:effectRef>
+          <a:fontRef idx="minor">
+            <a:schemeClr val="lt1"/>
+          </a:fontRef>
+        </p:style>
+        <p:txBody>
+          <a:bodyPr rtlCol="0" anchor="ctr"/>
+          <a:lstStyle/>
+          <a:p>
+            <a:pPr algn="ctr"/>
+            <a:endParaRPr lang="en-DE"/>
+          </a:p>
+        </p:txBody>
+      </p:sp>
+      <p:sp>
+        <p:nvSpPr>
+          <p:cNvPr id="17" name="Triangle 16">
+            <a:extLst>
+              <a:ext uri="{FF2B5EF4-FFF2-40B4-BE49-F238E27FC236}">
+                <a16:creationId xmlns:a16="http://schemas.microsoft.com/office/drawing/2014/main" id="{6D659EE6-C04F-FD42-8765-0E5AE4632E97}"/>
+              </a:ext>
+            </a:extLst>
+          </p:cNvPr>
+          <p:cNvSpPr/>
+          <p:nvPr/>
+        </p:nvSpPr>
+        <p:spPr>
+          <a:xfrm>
+            <a:off x="6758152" y="3805996"/>
+            <a:ext cx="178676" cy="145754"/>
+          </a:xfrm>
+          <a:prstGeom prst="triangle">
+            <a:avLst/>
+          </a:prstGeom>
+          <a:solidFill>
+            <a:schemeClr val="accent6">
+              <a:lumMod val="75000"/>
+            </a:schemeClr>
+          </a:solidFill>
+          <a:ln>
+            <a:noFill/>
+          </a:ln>
+        </p:spPr>
+        <p:style>
+          <a:lnRef idx="2">
+            <a:schemeClr val="accent1">
+              <a:shade val="50000"/>
+            </a:schemeClr>
+          </a:lnRef>
+          <a:fillRef idx="1">
+            <a:schemeClr val="accent1"/>
+          </a:fillRef>
+          <a:effectRef idx="0">
+            <a:schemeClr val="accent1"/>
+          </a:effectRef>
+          <a:fontRef idx="minor">
+            <a:schemeClr val="lt1"/>
+          </a:fontRef>
+        </p:style>
+        <p:txBody>
+          <a:bodyPr rtlCol="0" anchor="ctr"/>
+          <a:lstStyle/>
+          <a:p>
+            <a:pPr algn="ctr"/>
+            <a:endParaRPr lang="en-DE"/>
+          </a:p>
+        </p:txBody>
+      </p:sp>
+      <p:sp>
+        <p:nvSpPr>
+          <p:cNvPr id="18" name="Triangle 17">
+            <a:extLst>
+              <a:ext uri="{FF2B5EF4-FFF2-40B4-BE49-F238E27FC236}">
+                <a16:creationId xmlns:a16="http://schemas.microsoft.com/office/drawing/2014/main" id="{0A31ABFF-C85B-F147-A26D-7FF529CCE207}"/>
+              </a:ext>
+            </a:extLst>
+          </p:cNvPr>
+          <p:cNvSpPr/>
+          <p:nvPr/>
+        </p:nvSpPr>
+        <p:spPr>
+          <a:xfrm>
+            <a:off x="6910552" y="3958396"/>
+            <a:ext cx="178676" cy="145754"/>
+          </a:xfrm>
+          <a:prstGeom prst="triangle">
+            <a:avLst/>
+          </a:prstGeom>
+          <a:solidFill>
+            <a:schemeClr val="accent6">
+              <a:lumMod val="75000"/>
+            </a:schemeClr>
+          </a:solidFill>
+          <a:ln>
+            <a:noFill/>
+          </a:ln>
+        </p:spPr>
+        <p:style>
+          <a:lnRef idx="2">
+            <a:schemeClr val="accent1">
+              <a:shade val="50000"/>
+            </a:schemeClr>
+          </a:lnRef>
+          <a:fillRef idx="1">
+            <a:schemeClr val="accent1"/>
+          </a:fillRef>
+          <a:effectRef idx="0">
+            <a:schemeClr val="accent1"/>
+          </a:effectRef>
+          <a:fontRef idx="minor">
+            <a:schemeClr val="lt1"/>
+          </a:fontRef>
+        </p:style>
+        <p:txBody>
+          <a:bodyPr rtlCol="0" anchor="ctr"/>
+          <a:lstStyle/>
+          <a:p>
+            <a:pPr algn="ctr"/>
+            <a:endParaRPr lang="en-DE"/>
+          </a:p>
+        </p:txBody>
+      </p:sp>
+      <p:sp>
+        <p:nvSpPr>
+          <p:cNvPr id="19" name="Triangle 18">
+            <a:extLst>
+              <a:ext uri="{FF2B5EF4-FFF2-40B4-BE49-F238E27FC236}">
+                <a16:creationId xmlns:a16="http://schemas.microsoft.com/office/drawing/2014/main" id="{8D2DE04B-A5F6-A54E-B007-0A6D3D54B63E}"/>
+              </a:ext>
+            </a:extLst>
+          </p:cNvPr>
+          <p:cNvSpPr/>
+          <p:nvPr/>
+        </p:nvSpPr>
+        <p:spPr>
+          <a:xfrm>
+            <a:off x="6952594" y="3793543"/>
+            <a:ext cx="178676" cy="145754"/>
+          </a:xfrm>
+          <a:prstGeom prst="triangle">
+            <a:avLst/>
+          </a:prstGeom>
+          <a:solidFill>
+            <a:schemeClr val="accent6">
+              <a:lumMod val="75000"/>
+            </a:schemeClr>
+          </a:solidFill>
+          <a:ln>
+            <a:noFill/>
+          </a:ln>
+        </p:spPr>
+        <p:style>
+          <a:lnRef idx="2">
+            <a:schemeClr val="accent1">
+              <a:shade val="50000"/>
+            </a:schemeClr>
+          </a:lnRef>
+          <a:fillRef idx="1">
+            <a:schemeClr val="accent1"/>
+          </a:fillRef>
+          <a:effectRef idx="0">
+            <a:schemeClr val="accent1"/>
+          </a:effectRef>
+          <a:fontRef idx="minor">
+            <a:schemeClr val="lt1"/>
+          </a:fontRef>
+        </p:style>
+        <p:txBody>
+          <a:bodyPr rtlCol="0" anchor="ctr"/>
+          <a:lstStyle/>
+          <a:p>
+            <a:pPr algn="ctr"/>
+            <a:endParaRPr lang="en-DE"/>
+          </a:p>
+        </p:txBody>
+      </p:sp>
+      <p:sp>
+        <p:nvSpPr>
+          <p:cNvPr id="20" name="Triangle 19">
+            <a:extLst>
+              <a:ext uri="{FF2B5EF4-FFF2-40B4-BE49-F238E27FC236}">
+                <a16:creationId xmlns:a16="http://schemas.microsoft.com/office/drawing/2014/main" id="{81019CBD-9BA0-AA42-A623-371EBAAE2B08}"/>
+              </a:ext>
+            </a:extLst>
+          </p:cNvPr>
+          <p:cNvSpPr/>
+          <p:nvPr/>
+        </p:nvSpPr>
+        <p:spPr>
+          <a:xfrm>
+            <a:off x="6579476" y="4001366"/>
+            <a:ext cx="178676" cy="145754"/>
+          </a:xfrm>
+          <a:prstGeom prst="triangle">
+            <a:avLst/>
+          </a:prstGeom>
+          <a:solidFill>
+            <a:schemeClr val="accent6">
+              <a:lumMod val="75000"/>
+            </a:schemeClr>
+          </a:solidFill>
+          <a:ln>
+            <a:noFill/>
+          </a:ln>
+        </p:spPr>
+        <p:style>
+          <a:lnRef idx="2">
+            <a:schemeClr val="accent1">
+              <a:shade val="50000"/>
+            </a:schemeClr>
+          </a:lnRef>
+          <a:fillRef idx="1">
+            <a:schemeClr val="accent1"/>
+          </a:fillRef>
+          <a:effectRef idx="0">
+            <a:schemeClr val="accent1"/>
+          </a:effectRef>
+          <a:fontRef idx="minor">
+            <a:schemeClr val="lt1"/>
+          </a:fontRef>
+        </p:style>
+        <p:txBody>
+          <a:bodyPr rtlCol="0" anchor="ctr"/>
+          <a:lstStyle/>
+          <a:p>
+            <a:pPr algn="ctr"/>
+            <a:endParaRPr lang="en-DE"/>
+          </a:p>
+        </p:txBody>
+      </p:sp>
+      <p:sp>
+        <p:nvSpPr>
+          <p:cNvPr id="21" name="Triangle 20">
+            <a:extLst>
+              <a:ext uri="{FF2B5EF4-FFF2-40B4-BE49-F238E27FC236}">
+                <a16:creationId xmlns:a16="http://schemas.microsoft.com/office/drawing/2014/main" id="{5819F79E-2C23-CA4A-BC2A-5C1B5CB7938B}"/>
+              </a:ext>
+            </a:extLst>
+          </p:cNvPr>
+          <p:cNvSpPr/>
+          <p:nvPr/>
+        </p:nvSpPr>
+        <p:spPr>
+          <a:xfrm>
+            <a:off x="7094485" y="3928489"/>
+            <a:ext cx="178676" cy="145754"/>
+          </a:xfrm>
+          <a:prstGeom prst="triangle">
+            <a:avLst/>
+          </a:prstGeom>
+          <a:solidFill>
+            <a:schemeClr val="accent6">
+              <a:lumMod val="75000"/>
+            </a:schemeClr>
+          </a:solidFill>
+          <a:ln>
+            <a:noFill/>
+          </a:ln>
+        </p:spPr>
+        <p:style>
+          <a:lnRef idx="2">
+            <a:schemeClr val="accent1">
+              <a:shade val="50000"/>
+            </a:schemeClr>
+          </a:lnRef>
+          <a:fillRef idx="1">
+            <a:schemeClr val="accent1"/>
+          </a:fillRef>
+          <a:effectRef idx="0">
+            <a:schemeClr val="accent1"/>
+          </a:effectRef>
+          <a:fontRef idx="minor">
+            <a:schemeClr val="lt1"/>
+          </a:fontRef>
+        </p:style>
+        <p:txBody>
+          <a:bodyPr rtlCol="0" anchor="ctr"/>
+          <a:lstStyle/>
+          <a:p>
+            <a:pPr algn="ctr"/>
+            <a:endParaRPr lang="en-DE"/>
+          </a:p>
+        </p:txBody>
+      </p:sp>
+      <p:sp>
+        <p:nvSpPr>
+          <p:cNvPr id="22" name="Triangle 21">
+            <a:extLst>
+              <a:ext uri="{FF2B5EF4-FFF2-40B4-BE49-F238E27FC236}">
+                <a16:creationId xmlns:a16="http://schemas.microsoft.com/office/drawing/2014/main" id="{0D957827-2297-E64A-A3FB-1AD2B5FF6418}"/>
+              </a:ext>
+            </a:extLst>
+          </p:cNvPr>
+          <p:cNvSpPr/>
+          <p:nvPr/>
+        </p:nvSpPr>
+        <p:spPr>
+          <a:xfrm>
+            <a:off x="6821214" y="4099021"/>
+            <a:ext cx="178676" cy="145754"/>
+          </a:xfrm>
+          <a:prstGeom prst="triangle">
+            <a:avLst/>
+          </a:prstGeom>
+          <a:solidFill>
+            <a:schemeClr val="accent6">
+              <a:lumMod val="75000"/>
+            </a:schemeClr>
+          </a:solidFill>
+          <a:ln>
+            <a:noFill/>
+          </a:ln>
+        </p:spPr>
+        <p:style>
+          <a:lnRef idx="2">
+            <a:schemeClr val="accent1">
+              <a:shade val="50000"/>
+            </a:schemeClr>
+          </a:lnRef>
+          <a:fillRef idx="1">
+            <a:schemeClr val="accent1"/>
+          </a:fillRef>
+          <a:effectRef idx="0">
+            <a:schemeClr val="accent1"/>
+          </a:effectRef>
+          <a:fontRef idx="minor">
+            <a:schemeClr val="lt1"/>
+          </a:fontRef>
+        </p:style>
+        <p:txBody>
+          <a:bodyPr rtlCol="0" anchor="ctr"/>
+          <a:lstStyle/>
+          <a:p>
+            <a:pPr algn="ctr"/>
+            <a:endParaRPr lang="en-DE"/>
+          </a:p>
+        </p:txBody>
+      </p:sp>
+      <p:sp>
+        <p:nvSpPr>
+          <p:cNvPr id="23" name="Triangle 22">
+            <a:extLst>
+              <a:ext uri="{FF2B5EF4-FFF2-40B4-BE49-F238E27FC236}">
+                <a16:creationId xmlns:a16="http://schemas.microsoft.com/office/drawing/2014/main" id="{F0F7DD13-D965-E548-92A5-F1A59278CEC6}"/>
+              </a:ext>
+            </a:extLst>
+          </p:cNvPr>
+          <p:cNvSpPr/>
+          <p:nvPr/>
+        </p:nvSpPr>
+        <p:spPr>
+          <a:xfrm>
+            <a:off x="7062952" y="4110796"/>
+            <a:ext cx="178676" cy="145754"/>
+          </a:xfrm>
+          <a:prstGeom prst="triangle">
+            <a:avLst/>
+          </a:prstGeom>
+          <a:solidFill>
+            <a:schemeClr val="accent6">
+              <a:lumMod val="75000"/>
+            </a:schemeClr>
+          </a:solidFill>
+          <a:ln>
+            <a:noFill/>
+          </a:ln>
+        </p:spPr>
+        <p:style>
+          <a:lnRef idx="2">
+            <a:schemeClr val="accent1">
+              <a:shade val="50000"/>
+            </a:schemeClr>
+          </a:lnRef>
+          <a:fillRef idx="1">
+            <a:schemeClr val="accent1"/>
+          </a:fillRef>
+          <a:effectRef idx="0">
+            <a:schemeClr val="accent1"/>
+          </a:effectRef>
+          <a:fontRef idx="minor">
+            <a:schemeClr val="lt1"/>
+          </a:fontRef>
+        </p:style>
+        <p:txBody>
+          <a:bodyPr rtlCol="0" anchor="ctr"/>
+          <a:lstStyle/>
+          <a:p>
+            <a:pPr algn="ctr"/>
+            <a:endParaRPr lang="en-DE"/>
+          </a:p>
+        </p:txBody>
+      </p:sp>
+      <p:sp>
+        <p:nvSpPr>
+          <p:cNvPr id="24" name="Triangle 23">
+            <a:extLst>
+              <a:ext uri="{FF2B5EF4-FFF2-40B4-BE49-F238E27FC236}">
+                <a16:creationId xmlns:a16="http://schemas.microsoft.com/office/drawing/2014/main" id="{656F9088-4DD9-C74A-937F-C91EBD129D29}"/>
+              </a:ext>
+            </a:extLst>
+          </p:cNvPr>
+          <p:cNvSpPr/>
+          <p:nvPr/>
+        </p:nvSpPr>
+        <p:spPr>
+          <a:xfrm>
+            <a:off x="6563710" y="3788955"/>
+            <a:ext cx="178676" cy="145754"/>
+          </a:xfrm>
+          <a:prstGeom prst="triangle">
+            <a:avLst/>
+          </a:prstGeom>
+          <a:solidFill>
+            <a:schemeClr val="accent6">
+              <a:lumMod val="75000"/>
+            </a:schemeClr>
+          </a:solidFill>
+          <a:ln>
+            <a:noFill/>
+          </a:ln>
+        </p:spPr>
+        <p:style>
+          <a:lnRef idx="2">
+            <a:schemeClr val="accent1">
+              <a:shade val="50000"/>
+            </a:schemeClr>
+          </a:lnRef>
+          <a:fillRef idx="1">
+            <a:schemeClr val="accent1"/>
+          </a:fillRef>
+          <a:effectRef idx="0">
+            <a:schemeClr val="accent1"/>
+          </a:effectRef>
+          <a:fontRef idx="minor">
+            <a:schemeClr val="lt1"/>
+          </a:fontRef>
+        </p:style>
+        <p:txBody>
+          <a:bodyPr rtlCol="0" anchor="ctr"/>
+          <a:lstStyle/>
+          <a:p>
+            <a:pPr algn="ctr"/>
+            <a:endParaRPr lang="en-DE"/>
+          </a:p>
+        </p:txBody>
+      </p:sp>
+      <p:sp>
+        <p:nvSpPr>
+          <p:cNvPr id="25" name="Rectangle 24">
+            <a:extLst>
+              <a:ext uri="{FF2B5EF4-FFF2-40B4-BE49-F238E27FC236}">
+                <a16:creationId xmlns:a16="http://schemas.microsoft.com/office/drawing/2014/main" id="{2E1080F2-1886-F646-8989-6E0396C58126}"/>
+              </a:ext>
+            </a:extLst>
+          </p:cNvPr>
+          <p:cNvSpPr/>
+          <p:nvPr/>
+        </p:nvSpPr>
+        <p:spPr>
+          <a:xfrm>
+            <a:off x="5346337" y="4031273"/>
+            <a:ext cx="134468" cy="145753"/>
+          </a:xfrm>
+          <a:prstGeom prst="rect">
+            <a:avLst/>
+          </a:prstGeom>
+          <a:ln>
+            <a:noFill/>
+          </a:ln>
+        </p:spPr>
+        <p:style>
+          <a:lnRef idx="2">
+            <a:schemeClr val="accent1">
+              <a:shade val="50000"/>
+            </a:schemeClr>
+          </a:lnRef>
+          <a:fillRef idx="1">
+            <a:schemeClr val="accent1"/>
+          </a:fillRef>
+          <a:effectRef idx="0">
+            <a:schemeClr val="accent1"/>
+          </a:effectRef>
+          <a:fontRef idx="minor">
+            <a:schemeClr val="lt1"/>
+          </a:fontRef>
+        </p:style>
+        <p:txBody>
+          <a:bodyPr rtlCol="0" anchor="ctr"/>
+          <a:lstStyle/>
+          <a:p>
+            <a:pPr algn="ctr"/>
+            <a:endParaRPr lang="en-DE"/>
+          </a:p>
+        </p:txBody>
+      </p:sp>
+      <p:sp>
+        <p:nvSpPr>
+          <p:cNvPr id="26" name="Rectangle 25">
+            <a:extLst>
+              <a:ext uri="{FF2B5EF4-FFF2-40B4-BE49-F238E27FC236}">
+                <a16:creationId xmlns:a16="http://schemas.microsoft.com/office/drawing/2014/main" id="{1D1C2689-F5CC-674D-8B26-47B15FBEAD1B}"/>
+              </a:ext>
+            </a:extLst>
+          </p:cNvPr>
+          <p:cNvSpPr/>
+          <p:nvPr/>
+        </p:nvSpPr>
+        <p:spPr>
+          <a:xfrm>
+            <a:off x="5498737" y="4183673"/>
+            <a:ext cx="134468" cy="145753"/>
+          </a:xfrm>
+          <a:prstGeom prst="rect">
+            <a:avLst/>
+          </a:prstGeom>
+          <a:ln>
+            <a:noFill/>
+          </a:ln>
+        </p:spPr>
+        <p:style>
+          <a:lnRef idx="2">
+            <a:schemeClr val="accent1">
+              <a:shade val="50000"/>
+            </a:schemeClr>
+          </a:lnRef>
+          <a:fillRef idx="1">
+            <a:schemeClr val="accent1"/>
+          </a:fillRef>
+          <a:effectRef idx="0">
+            <a:schemeClr val="accent1"/>
+          </a:effectRef>
+          <a:fontRef idx="minor">
+            <a:schemeClr val="lt1"/>
+          </a:fontRef>
+        </p:style>
+        <p:txBody>
+          <a:bodyPr rtlCol="0" anchor="ctr"/>
+          <a:lstStyle/>
+          <a:p>
+            <a:pPr algn="ctr"/>
+            <a:endParaRPr lang="en-DE"/>
+          </a:p>
+        </p:txBody>
+      </p:sp>
+      <p:sp>
+        <p:nvSpPr>
+          <p:cNvPr id="27" name="Rectangle 26">
+            <a:extLst>
+              <a:ext uri="{FF2B5EF4-FFF2-40B4-BE49-F238E27FC236}">
+                <a16:creationId xmlns:a16="http://schemas.microsoft.com/office/drawing/2014/main" id="{C9513F72-B757-0E4B-A4A1-91169785F87A}"/>
+              </a:ext>
+            </a:extLst>
+          </p:cNvPr>
+          <p:cNvSpPr/>
+          <p:nvPr/>
+        </p:nvSpPr>
+        <p:spPr>
+          <a:xfrm>
+            <a:off x="5545693" y="4008310"/>
+            <a:ext cx="134468" cy="145753"/>
+          </a:xfrm>
+          <a:prstGeom prst="rect">
+            <a:avLst/>
+          </a:prstGeom>
+          <a:ln>
+            <a:noFill/>
+          </a:ln>
+        </p:spPr>
+        <p:style>
+          <a:lnRef idx="2">
+            <a:schemeClr val="accent1">
+              <a:shade val="50000"/>
+            </a:schemeClr>
+          </a:lnRef>
+          <a:fillRef idx="1">
+            <a:schemeClr val="accent1"/>
+          </a:fillRef>
+          <a:effectRef idx="0">
+            <a:schemeClr val="accent1"/>
+          </a:effectRef>
+          <a:fontRef idx="minor">
+            <a:schemeClr val="lt1"/>
+          </a:fontRef>
+        </p:style>
+        <p:txBody>
+          <a:bodyPr rtlCol="0" anchor="ctr"/>
+          <a:lstStyle/>
+          <a:p>
+            <a:pPr algn="ctr"/>
+            <a:endParaRPr lang="en-DE"/>
+          </a:p>
+        </p:txBody>
+      </p:sp>
+      <p:sp>
+        <p:nvSpPr>
+          <p:cNvPr id="28" name="Rectangle 27">
+            <a:extLst>
+              <a:ext uri="{FF2B5EF4-FFF2-40B4-BE49-F238E27FC236}">
+                <a16:creationId xmlns:a16="http://schemas.microsoft.com/office/drawing/2014/main" id="{112D2AA5-3477-D146-BCF8-229A2984F003}"/>
+              </a:ext>
+            </a:extLst>
+          </p:cNvPr>
+          <p:cNvSpPr/>
+          <p:nvPr/>
+        </p:nvSpPr>
+        <p:spPr>
+          <a:xfrm>
+            <a:off x="5319044" y="4232038"/>
+            <a:ext cx="134468" cy="145753"/>
+          </a:xfrm>
+          <a:prstGeom prst="rect">
+            <a:avLst/>
+          </a:prstGeom>
+          <a:ln>
+            <a:noFill/>
+          </a:ln>
+        </p:spPr>
+        <p:style>
+          <a:lnRef idx="2">
+            <a:schemeClr val="accent1">
+              <a:shade val="50000"/>
+            </a:schemeClr>
+          </a:lnRef>
+          <a:fillRef idx="1">
+            <a:schemeClr val="accent1"/>
+          </a:fillRef>
+          <a:effectRef idx="0">
+            <a:schemeClr val="accent1"/>
+          </a:effectRef>
+          <a:fontRef idx="minor">
+            <a:schemeClr val="lt1"/>
+          </a:fontRef>
+        </p:style>
+        <p:txBody>
+          <a:bodyPr rtlCol="0" anchor="ctr"/>
+          <a:lstStyle/>
+          <a:p>
+            <a:pPr algn="ctr"/>
+            <a:endParaRPr lang="en-DE"/>
+          </a:p>
+        </p:txBody>
+      </p:sp>
+      <p:sp>
+        <p:nvSpPr>
+          <p:cNvPr id="29" name="Rectangle 28">
+            <a:extLst>
+              <a:ext uri="{FF2B5EF4-FFF2-40B4-BE49-F238E27FC236}">
+                <a16:creationId xmlns:a16="http://schemas.microsoft.com/office/drawing/2014/main" id="{DFEFDF4F-E723-B949-9302-E0852DAB1F59}"/>
+              </a:ext>
+            </a:extLst>
+          </p:cNvPr>
+          <p:cNvSpPr/>
+          <p:nvPr/>
+        </p:nvSpPr>
+        <p:spPr>
+          <a:xfrm>
+            <a:off x="5669775" y="4147119"/>
+            <a:ext cx="134468" cy="145753"/>
+          </a:xfrm>
+          <a:prstGeom prst="rect">
+            <a:avLst/>
+          </a:prstGeom>
+          <a:ln>
+            <a:noFill/>
+          </a:ln>
+        </p:spPr>
+        <p:style>
+          <a:lnRef idx="2">
+            <a:schemeClr val="accent1">
+              <a:shade val="50000"/>
+            </a:schemeClr>
+          </a:lnRef>
+          <a:fillRef idx="1">
+            <a:schemeClr val="accent1"/>
+          </a:fillRef>
+          <a:effectRef idx="0">
+            <a:schemeClr val="accent1"/>
+          </a:effectRef>
+          <a:fontRef idx="minor">
+            <a:schemeClr val="lt1"/>
+          </a:fontRef>
+        </p:style>
+        <p:txBody>
+          <a:bodyPr rtlCol="0" anchor="ctr"/>
+          <a:lstStyle/>
+          <a:p>
+            <a:pPr algn="ctr"/>
+            <a:endParaRPr lang="en-DE"/>
+          </a:p>
+        </p:txBody>
+      </p:sp>
+      <p:sp>
+        <p:nvSpPr>
+          <p:cNvPr id="31" name="Oval 30">
+            <a:extLst>
+              <a:ext uri="{FF2B5EF4-FFF2-40B4-BE49-F238E27FC236}">
+                <a16:creationId xmlns:a16="http://schemas.microsoft.com/office/drawing/2014/main" id="{8D276726-E554-F142-9A68-0E317A01D010}"/>
+              </a:ext>
+            </a:extLst>
+          </p:cNvPr>
+          <p:cNvSpPr/>
+          <p:nvPr/>
+        </p:nvSpPr>
+        <p:spPr>
+          <a:xfrm>
+            <a:off x="6422659" y="3710508"/>
+            <a:ext cx="976618" cy="667283"/>
+          </a:xfrm>
+          <a:prstGeom prst="ellipse">
+            <a:avLst/>
+          </a:prstGeom>
+          <a:noFill/>
+          <a:ln w="28575">
+            <a:solidFill>
+              <a:schemeClr val="tx1"/>
+            </a:solidFill>
+            <a:prstDash val="dash"/>
+          </a:ln>
+        </p:spPr>
+        <p:style>
+          <a:lnRef idx="2">
+            <a:schemeClr val="accent1">
+              <a:shade val="50000"/>
+            </a:schemeClr>
+          </a:lnRef>
+          <a:fillRef idx="1">
+            <a:schemeClr val="accent1"/>
+          </a:fillRef>
+          <a:effectRef idx="0">
+            <a:schemeClr val="accent1"/>
+          </a:effectRef>
+          <a:fontRef idx="minor">
+            <a:schemeClr val="lt1"/>
+          </a:fontRef>
+        </p:style>
+        <p:txBody>
+          <a:bodyPr rtlCol="0" anchor="ctr"/>
+          <a:lstStyle/>
+          <a:p>
+            <a:pPr algn="ctr"/>
+            <a:endParaRPr lang="en-DE"/>
+          </a:p>
+        </p:txBody>
+      </p:sp>
+      <p:sp>
+        <p:nvSpPr>
+          <p:cNvPr id="33" name="Oval 32">
+            <a:extLst>
+              <a:ext uri="{FF2B5EF4-FFF2-40B4-BE49-F238E27FC236}">
+                <a16:creationId xmlns:a16="http://schemas.microsoft.com/office/drawing/2014/main" id="{CFE7A73A-C7CA-0741-A3B2-FE84E8FED37E}"/>
+              </a:ext>
+            </a:extLst>
+          </p:cNvPr>
+          <p:cNvSpPr/>
+          <p:nvPr/>
+        </p:nvSpPr>
+        <p:spPr>
+          <a:xfrm>
+            <a:off x="5149744" y="3412817"/>
+            <a:ext cx="94593" cy="94593"/>
+          </a:xfrm>
+          <a:prstGeom prst="ellipse">
+            <a:avLst/>
+          </a:prstGeom>
+          <a:solidFill>
+            <a:srgbClr val="FF0000"/>
+          </a:solidFill>
+          <a:ln>
+            <a:noFill/>
+          </a:ln>
+        </p:spPr>
+        <p:style>
+          <a:lnRef idx="2">
+            <a:schemeClr val="accent1">
+              <a:shade val="50000"/>
+            </a:schemeClr>
+          </a:lnRef>
+          <a:fillRef idx="1">
+            <a:schemeClr val="accent1"/>
+          </a:fillRef>
+          <a:effectRef idx="0">
+            <a:schemeClr val="accent1"/>
+          </a:effectRef>
+          <a:fontRef idx="minor">
+            <a:schemeClr val="lt1"/>
+          </a:fontRef>
+        </p:style>
+        <p:txBody>
+          <a:bodyPr rtlCol="0" anchor="ctr"/>
+          <a:lstStyle/>
+          <a:p>
+            <a:pPr algn="ctr"/>
+            <a:endParaRPr lang="en-DE"/>
+          </a:p>
+        </p:txBody>
+      </p:sp>
+      <p:sp>
+        <p:nvSpPr>
+          <p:cNvPr id="34" name="Oval 33">
+            <a:extLst>
+              <a:ext uri="{FF2B5EF4-FFF2-40B4-BE49-F238E27FC236}">
+                <a16:creationId xmlns:a16="http://schemas.microsoft.com/office/drawing/2014/main" id="{A2412EB8-0D6F-0D40-9F74-47EECB77FF2B}"/>
+              </a:ext>
+            </a:extLst>
+          </p:cNvPr>
+          <p:cNvSpPr/>
+          <p:nvPr/>
+        </p:nvSpPr>
+        <p:spPr>
+          <a:xfrm>
+            <a:off x="5466128" y="4143574"/>
+            <a:ext cx="94593" cy="94593"/>
+          </a:xfrm>
+          <a:prstGeom prst="ellipse">
+            <a:avLst/>
+          </a:prstGeom>
+          <a:solidFill>
+            <a:srgbClr val="FF0000"/>
+          </a:solidFill>
+          <a:ln>
+            <a:noFill/>
+          </a:ln>
+        </p:spPr>
+        <p:style>
+          <a:lnRef idx="2">
+            <a:schemeClr val="accent1">
+              <a:shade val="50000"/>
+            </a:schemeClr>
+          </a:lnRef>
+          <a:fillRef idx="1">
+            <a:schemeClr val="accent1"/>
+          </a:fillRef>
+          <a:effectRef idx="0">
+            <a:schemeClr val="accent1"/>
+          </a:effectRef>
+          <a:fontRef idx="minor">
+            <a:schemeClr val="lt1"/>
+          </a:fontRef>
+        </p:style>
+        <p:txBody>
+          <a:bodyPr rtlCol="0" anchor="ctr"/>
+          <a:lstStyle/>
+          <a:p>
+            <a:pPr algn="ctr"/>
+            <a:endParaRPr lang="en-DE"/>
+          </a:p>
+        </p:txBody>
+      </p:sp>
+      <p:sp>
+        <p:nvSpPr>
+          <p:cNvPr id="35" name="Oval 34">
+            <a:extLst>
+              <a:ext uri="{FF2B5EF4-FFF2-40B4-BE49-F238E27FC236}">
+                <a16:creationId xmlns:a16="http://schemas.microsoft.com/office/drawing/2014/main" id="{D25E7DF6-EB35-FD4C-B409-B97CA7EEE974}"/>
+              </a:ext>
+            </a:extLst>
+          </p:cNvPr>
+          <p:cNvSpPr/>
+          <p:nvPr/>
+        </p:nvSpPr>
+        <p:spPr>
+          <a:xfrm>
+            <a:off x="6860099" y="3979650"/>
+            <a:ext cx="94593" cy="94593"/>
+          </a:xfrm>
+          <a:prstGeom prst="ellipse">
+            <a:avLst/>
+          </a:prstGeom>
+          <a:solidFill>
+            <a:srgbClr val="FF0000"/>
+          </a:solidFill>
+          <a:ln>
+            <a:noFill/>
+          </a:ln>
+        </p:spPr>
+        <p:style>
+          <a:lnRef idx="2">
+            <a:schemeClr val="accent1">
+              <a:shade val="50000"/>
+            </a:schemeClr>
+          </a:lnRef>
+          <a:fillRef idx="1">
+            <a:schemeClr val="accent1"/>
+          </a:fillRef>
+          <a:effectRef idx="0">
+            <a:schemeClr val="accent1"/>
+          </a:effectRef>
+          <a:fontRef idx="minor">
+            <a:schemeClr val="lt1"/>
+          </a:fontRef>
+        </p:style>
+        <p:txBody>
+          <a:bodyPr rtlCol="0" anchor="ctr"/>
+          <a:lstStyle/>
+          <a:p>
+            <a:pPr algn="ctr"/>
+            <a:endParaRPr lang="en-DE"/>
+          </a:p>
+        </p:txBody>
+      </p:sp>
+    </p:spTree>
+    <p:extLst>
+      <p:ext uri="{BB962C8B-B14F-4D97-AF65-F5344CB8AC3E}">
+        <p14:creationId xmlns:p14="http://schemas.microsoft.com/office/powerpoint/2010/main" val="3537247199"/>
+      </p:ext>
+    </p:extLst>
+  </p:cSld>
+  <p:clrMapOvr>
+    <a:masterClrMapping/>
+  </p:clrMapOvr>
+</p:sld>
+</file>
+
+<file path=ppt/slides/slide3.xml><?xml version="1.0" encoding="utf-8"?>
 <p:sld xmlns:a="http://schemas.openxmlformats.org/drawingml/2006/main" xmlns:r="http://schemas.openxmlformats.org/officeDocument/2006/relationships" xmlns:p="http://schemas.openxmlformats.org/presentationml/2006/main">
   <p:cSld>
     <p:spTree>
@@ -9957,641 +11411,6 @@
 </p:sld>
 </file>
 
-<file path=ppt/slides/slide3.xml><?xml version="1.0" encoding="utf-8"?>
-<p:sld xmlns:a="http://schemas.openxmlformats.org/drawingml/2006/main" xmlns:r="http://schemas.openxmlformats.org/officeDocument/2006/relationships" xmlns:p="http://schemas.openxmlformats.org/presentationml/2006/main">
-  <p:cSld>
-    <p:spTree>
-      <p:nvGrpSpPr>
-        <p:cNvPr id="1" name=""/>
-        <p:cNvGrpSpPr/>
-        <p:nvPr/>
-      </p:nvGrpSpPr>
-      <p:grpSpPr>
-        <a:xfrm>
-          <a:off x="0" y="0"/>
-          <a:ext cx="0" cy="0"/>
-          <a:chOff x="0" y="0"/>
-          <a:chExt cx="0" cy="0"/>
-        </a:xfrm>
-      </p:grpSpPr>
-      <p:sp>
-        <p:nvSpPr>
-          <p:cNvPr id="2" name="Title 1">
-            <a:extLst>
-              <a:ext uri="{FF2B5EF4-FFF2-40B4-BE49-F238E27FC236}">
-                <a16:creationId xmlns:a16="http://schemas.microsoft.com/office/drawing/2014/main" id="{14AF8AEE-3E67-F441-A4FC-33F99CD3111D}"/>
-              </a:ext>
-            </a:extLst>
-          </p:cNvPr>
-          <p:cNvSpPr>
-            <a:spLocks noGrp="1"/>
-          </p:cNvSpPr>
-          <p:nvPr>
-            <p:ph type="title"/>
-          </p:nvPr>
-        </p:nvSpPr>
-        <p:spPr/>
-        <p:txBody>
-          <a:bodyPr/>
-          <a:lstStyle/>
-          <a:p>
-            <a:r>
-              <a:rPr lang="en-DE" dirty="0"/>
-              <a:t>feature-based clustering</a:t>
-            </a:r>
-          </a:p>
-        </p:txBody>
-      </p:sp>
-      <p:cxnSp>
-        <p:nvCxnSpPr>
-          <p:cNvPr id="5" name="Straight Arrow Connector 4">
-            <a:extLst>
-              <a:ext uri="{FF2B5EF4-FFF2-40B4-BE49-F238E27FC236}">
-                <a16:creationId xmlns:a16="http://schemas.microsoft.com/office/drawing/2014/main" id="{09D1EB48-54E9-9B49-8C15-7002755E6EAE}"/>
-              </a:ext>
-            </a:extLst>
-          </p:cNvPr>
-          <p:cNvCxnSpPr>
-            <a:cxnSpLocks/>
-          </p:cNvCxnSpPr>
-          <p:nvPr/>
-        </p:nvCxnSpPr>
-        <p:spPr>
-          <a:xfrm>
-            <a:off x="4697936" y="4887988"/>
-            <a:ext cx="3070806" cy="0"/>
-          </a:xfrm>
-          <a:prstGeom prst="straightConnector1">
-            <a:avLst/>
-          </a:prstGeom>
-          <a:ln w="57150">
-            <a:tailEnd type="triangle"/>
-          </a:ln>
-        </p:spPr>
-        <p:style>
-          <a:lnRef idx="1">
-            <a:schemeClr val="accent1"/>
-          </a:lnRef>
-          <a:fillRef idx="0">
-            <a:schemeClr val="accent1"/>
-          </a:fillRef>
-          <a:effectRef idx="0">
-            <a:schemeClr val="accent1"/>
-          </a:effectRef>
-          <a:fontRef idx="minor">
-            <a:schemeClr val="tx1"/>
-          </a:fontRef>
-        </p:style>
-      </p:cxnSp>
-      <p:cxnSp>
-        <p:nvCxnSpPr>
-          <p:cNvPr id="6" name="Straight Arrow Connector 5">
-            <a:extLst>
-              <a:ext uri="{FF2B5EF4-FFF2-40B4-BE49-F238E27FC236}">
-                <a16:creationId xmlns:a16="http://schemas.microsoft.com/office/drawing/2014/main" id="{2133E6F8-C574-A847-A02C-16CAF0A4B8B6}"/>
-              </a:ext>
-            </a:extLst>
-          </p:cNvPr>
-          <p:cNvCxnSpPr>
-            <a:cxnSpLocks/>
-          </p:cNvCxnSpPr>
-          <p:nvPr/>
-        </p:nvCxnSpPr>
-        <p:spPr>
-          <a:xfrm flipV="1">
-            <a:off x="4715866" y="3006547"/>
-            <a:ext cx="0" cy="1890406"/>
-          </a:xfrm>
-          <a:prstGeom prst="straightConnector1">
-            <a:avLst/>
-          </a:prstGeom>
-          <a:ln w="57150">
-            <a:tailEnd type="triangle"/>
-          </a:ln>
-        </p:spPr>
-        <p:style>
-          <a:lnRef idx="1">
-            <a:schemeClr val="accent1"/>
-          </a:lnRef>
-          <a:fillRef idx="0">
-            <a:schemeClr val="accent1"/>
-          </a:fillRef>
-          <a:effectRef idx="0">
-            <a:schemeClr val="accent1"/>
-          </a:effectRef>
-          <a:fontRef idx="minor">
-            <a:schemeClr val="tx1"/>
-          </a:fontRef>
-        </p:style>
-      </p:cxnSp>
-      <p:sp>
-        <p:nvSpPr>
-          <p:cNvPr id="9" name="TextBox 8">
-            <a:extLst>
-              <a:ext uri="{FF2B5EF4-FFF2-40B4-BE49-F238E27FC236}">
-                <a16:creationId xmlns:a16="http://schemas.microsoft.com/office/drawing/2014/main" id="{64D1D4CC-2A42-C044-A500-B56D76DFCB94}"/>
-              </a:ext>
-            </a:extLst>
-          </p:cNvPr>
-          <p:cNvSpPr txBox="1"/>
-          <p:nvPr/>
-        </p:nvSpPr>
-        <p:spPr>
-          <a:xfrm>
-            <a:off x="3516082" y="2954586"/>
-            <a:ext cx="1024128" cy="369332"/>
-          </a:xfrm>
-          <a:prstGeom prst="rect">
-            <a:avLst/>
-          </a:prstGeom>
-          <a:noFill/>
-        </p:spPr>
-        <p:txBody>
-          <a:bodyPr wrap="square" rtlCol="0">
-            <a:spAutoFit/>
-          </a:bodyPr>
-          <a:lstStyle/>
-          <a:p>
-            <a:pPr algn="ctr"/>
-            <a:r>
-              <a:rPr lang="en-DE" dirty="0"/>
-              <a:t>entropy</a:t>
-            </a:r>
-          </a:p>
-        </p:txBody>
-      </p:sp>
-      <p:sp>
-        <p:nvSpPr>
-          <p:cNvPr id="10" name="TextBox 9">
-            <a:extLst>
-              <a:ext uri="{FF2B5EF4-FFF2-40B4-BE49-F238E27FC236}">
-                <a16:creationId xmlns:a16="http://schemas.microsoft.com/office/drawing/2014/main" id="{B5C1435A-C21F-1644-BB17-06E0045A9EB3}"/>
-              </a:ext>
-            </a:extLst>
-          </p:cNvPr>
-          <p:cNvSpPr txBox="1"/>
-          <p:nvPr/>
-        </p:nvSpPr>
-        <p:spPr>
-          <a:xfrm>
-            <a:off x="6613155" y="4970909"/>
-            <a:ext cx="1690098" cy="369332"/>
-          </a:xfrm>
-          <a:prstGeom prst="rect">
-            <a:avLst/>
-          </a:prstGeom>
-          <a:noFill/>
-        </p:spPr>
-        <p:txBody>
-          <a:bodyPr wrap="square" rtlCol="0">
-            <a:spAutoFit/>
-          </a:bodyPr>
-          <a:lstStyle/>
-          <a:p>
-            <a:pPr algn="ctr"/>
-            <a:r>
-              <a:rPr lang="en-DE" dirty="0"/>
-              <a:t>autocorrelation</a:t>
-            </a:r>
-          </a:p>
-        </p:txBody>
-      </p:sp>
-      <p:sp>
-        <p:nvSpPr>
-          <p:cNvPr id="12" name="Oval 11">
-            <a:extLst>
-              <a:ext uri="{FF2B5EF4-FFF2-40B4-BE49-F238E27FC236}">
-                <a16:creationId xmlns:a16="http://schemas.microsoft.com/office/drawing/2014/main" id="{D54DB8F5-94B6-B94B-896C-2490DAA4571E}"/>
-              </a:ext>
-            </a:extLst>
-          </p:cNvPr>
-          <p:cNvSpPr/>
-          <p:nvPr/>
-        </p:nvSpPr>
-        <p:spPr>
-          <a:xfrm>
-            <a:off x="4957483" y="3429000"/>
-            <a:ext cx="134469" cy="147912"/>
-          </a:xfrm>
-          <a:prstGeom prst="ellipse">
-            <a:avLst/>
-          </a:prstGeom>
-          <a:solidFill>
-            <a:schemeClr val="accent6">
-              <a:lumMod val="60000"/>
-              <a:lumOff val="40000"/>
-            </a:schemeClr>
-          </a:solidFill>
-          <a:ln>
-            <a:noFill/>
-          </a:ln>
-        </p:spPr>
-        <p:style>
-          <a:lnRef idx="2">
-            <a:schemeClr val="accent1">
-              <a:shade val="50000"/>
-            </a:schemeClr>
-          </a:lnRef>
-          <a:fillRef idx="1">
-            <a:schemeClr val="accent1"/>
-          </a:fillRef>
-          <a:effectRef idx="0">
-            <a:schemeClr val="accent1"/>
-          </a:effectRef>
-          <a:fontRef idx="minor">
-            <a:schemeClr val="lt1"/>
-          </a:fontRef>
-        </p:style>
-        <p:txBody>
-          <a:bodyPr rtlCol="0" anchor="ctr"/>
-          <a:lstStyle/>
-          <a:p>
-            <a:pPr algn="ctr"/>
-            <a:endParaRPr lang="en-DE"/>
-          </a:p>
-        </p:txBody>
-      </p:sp>
-      <p:sp>
-        <p:nvSpPr>
-          <p:cNvPr id="13" name="Oval 12">
-            <a:extLst>
-              <a:ext uri="{FF2B5EF4-FFF2-40B4-BE49-F238E27FC236}">
-                <a16:creationId xmlns:a16="http://schemas.microsoft.com/office/drawing/2014/main" id="{D715D40D-F94E-8848-ABF6-DD941BCE7BA3}"/>
-              </a:ext>
-            </a:extLst>
-          </p:cNvPr>
-          <p:cNvSpPr/>
-          <p:nvPr/>
-        </p:nvSpPr>
-        <p:spPr>
-          <a:xfrm>
-            <a:off x="5084676" y="3249962"/>
-            <a:ext cx="134469" cy="147912"/>
-          </a:xfrm>
-          <a:prstGeom prst="ellipse">
-            <a:avLst/>
-          </a:prstGeom>
-          <a:solidFill>
-            <a:schemeClr val="accent1"/>
-          </a:solidFill>
-          <a:ln>
-            <a:noFill/>
-          </a:ln>
-        </p:spPr>
-        <p:style>
-          <a:lnRef idx="2">
-            <a:schemeClr val="accent1">
-              <a:shade val="50000"/>
-            </a:schemeClr>
-          </a:lnRef>
-          <a:fillRef idx="1">
-            <a:schemeClr val="accent1"/>
-          </a:fillRef>
-          <a:effectRef idx="0">
-            <a:schemeClr val="accent1"/>
-          </a:effectRef>
-          <a:fontRef idx="minor">
-            <a:schemeClr val="lt1"/>
-          </a:fontRef>
-        </p:style>
-        <p:txBody>
-          <a:bodyPr rtlCol="0" anchor="ctr"/>
-          <a:lstStyle/>
-          <a:p>
-            <a:pPr algn="ctr"/>
-            <a:endParaRPr lang="en-DE"/>
-          </a:p>
-        </p:txBody>
-      </p:sp>
-      <p:sp>
-        <p:nvSpPr>
-          <p:cNvPr id="14" name="Oval 13">
-            <a:extLst>
-              <a:ext uri="{FF2B5EF4-FFF2-40B4-BE49-F238E27FC236}">
-                <a16:creationId xmlns:a16="http://schemas.microsoft.com/office/drawing/2014/main" id="{8CD2673B-F30B-C345-B900-A4168BDEBF7D}"/>
-              </a:ext>
-            </a:extLst>
-          </p:cNvPr>
-          <p:cNvSpPr/>
-          <p:nvPr/>
-        </p:nvSpPr>
-        <p:spPr>
-          <a:xfrm>
-            <a:off x="5151910" y="3453650"/>
-            <a:ext cx="134469" cy="147912"/>
-          </a:xfrm>
-          <a:prstGeom prst="ellipse">
-            <a:avLst/>
-          </a:prstGeom>
-          <a:solidFill>
-            <a:schemeClr val="accent2"/>
-          </a:solidFill>
-          <a:ln>
-            <a:noFill/>
-          </a:ln>
-        </p:spPr>
-        <p:style>
-          <a:lnRef idx="2">
-            <a:schemeClr val="accent1">
-              <a:shade val="50000"/>
-            </a:schemeClr>
-          </a:lnRef>
-          <a:fillRef idx="1">
-            <a:schemeClr val="accent1"/>
-          </a:fillRef>
-          <a:effectRef idx="0">
-            <a:schemeClr val="accent1"/>
-          </a:effectRef>
-          <a:fontRef idx="minor">
-            <a:schemeClr val="lt1"/>
-          </a:fontRef>
-        </p:style>
-        <p:txBody>
-          <a:bodyPr rtlCol="0" anchor="ctr"/>
-          <a:lstStyle/>
-          <a:p>
-            <a:pPr algn="ctr"/>
-            <a:endParaRPr lang="en-DE"/>
-          </a:p>
-        </p:txBody>
-      </p:sp>
-      <p:sp>
-        <p:nvSpPr>
-          <p:cNvPr id="15" name="Oval 14">
-            <a:extLst>
-              <a:ext uri="{FF2B5EF4-FFF2-40B4-BE49-F238E27FC236}">
-                <a16:creationId xmlns:a16="http://schemas.microsoft.com/office/drawing/2014/main" id="{E11A33F2-13C1-C642-80BC-F0F8B6C491DB}"/>
-              </a:ext>
-            </a:extLst>
-          </p:cNvPr>
-          <p:cNvSpPr/>
-          <p:nvPr/>
-        </p:nvSpPr>
-        <p:spPr>
-          <a:xfrm>
-            <a:off x="6478686" y="4515966"/>
-            <a:ext cx="134469" cy="147912"/>
-          </a:xfrm>
-          <a:prstGeom prst="ellipse">
-            <a:avLst/>
-          </a:prstGeom>
-          <a:solidFill>
-            <a:schemeClr val="accent4">
-              <a:lumMod val="50000"/>
-            </a:schemeClr>
-          </a:solidFill>
-          <a:ln>
-            <a:noFill/>
-          </a:ln>
-        </p:spPr>
-        <p:style>
-          <a:lnRef idx="2">
-            <a:schemeClr val="accent1">
-              <a:shade val="50000"/>
-            </a:schemeClr>
-          </a:lnRef>
-          <a:fillRef idx="1">
-            <a:schemeClr val="accent1"/>
-          </a:fillRef>
-          <a:effectRef idx="0">
-            <a:schemeClr val="accent1"/>
-          </a:effectRef>
-          <a:fontRef idx="minor">
-            <a:schemeClr val="lt1"/>
-          </a:fontRef>
-        </p:style>
-        <p:txBody>
-          <a:bodyPr rtlCol="0" anchor="ctr"/>
-          <a:lstStyle/>
-          <a:p>
-            <a:pPr algn="ctr"/>
-            <a:endParaRPr lang="en-DE"/>
-          </a:p>
-        </p:txBody>
-      </p:sp>
-      <p:sp>
-        <p:nvSpPr>
-          <p:cNvPr id="16" name="Oval 15">
-            <a:extLst>
-              <a:ext uri="{FF2B5EF4-FFF2-40B4-BE49-F238E27FC236}">
-                <a16:creationId xmlns:a16="http://schemas.microsoft.com/office/drawing/2014/main" id="{474D6E04-3164-904A-9F5D-2A2E30279849}"/>
-              </a:ext>
-            </a:extLst>
-          </p:cNvPr>
-          <p:cNvSpPr/>
-          <p:nvPr/>
-        </p:nvSpPr>
-        <p:spPr>
-          <a:xfrm>
-            <a:off x="6344217" y="4663878"/>
-            <a:ext cx="134469" cy="147912"/>
-          </a:xfrm>
-          <a:prstGeom prst="ellipse">
-            <a:avLst/>
-          </a:prstGeom>
-          <a:solidFill>
-            <a:srgbClr val="7030A0"/>
-          </a:solidFill>
-          <a:ln>
-            <a:noFill/>
-          </a:ln>
-        </p:spPr>
-        <p:style>
-          <a:lnRef idx="2">
-            <a:schemeClr val="accent1">
-              <a:shade val="50000"/>
-            </a:schemeClr>
-          </a:lnRef>
-          <a:fillRef idx="1">
-            <a:schemeClr val="accent1"/>
-          </a:fillRef>
-          <a:effectRef idx="0">
-            <a:schemeClr val="accent1"/>
-          </a:effectRef>
-          <a:fontRef idx="minor">
-            <a:schemeClr val="lt1"/>
-          </a:fontRef>
-        </p:style>
-        <p:txBody>
-          <a:bodyPr rtlCol="0" anchor="ctr"/>
-          <a:lstStyle/>
-          <a:p>
-            <a:pPr algn="ctr"/>
-            <a:endParaRPr lang="en-DE"/>
-          </a:p>
-        </p:txBody>
-      </p:sp>
-      <p:sp>
-        <p:nvSpPr>
-          <p:cNvPr id="17" name="Oval 16">
-            <a:extLst>
-              <a:ext uri="{FF2B5EF4-FFF2-40B4-BE49-F238E27FC236}">
-                <a16:creationId xmlns:a16="http://schemas.microsoft.com/office/drawing/2014/main" id="{1539A826-2EAB-8640-9DFD-1C7AC8A40AFC}"/>
-              </a:ext>
-            </a:extLst>
-          </p:cNvPr>
-          <p:cNvSpPr/>
-          <p:nvPr/>
-        </p:nvSpPr>
-        <p:spPr>
-          <a:xfrm>
-            <a:off x="6680389" y="4589922"/>
-            <a:ext cx="134469" cy="147912"/>
-          </a:xfrm>
-          <a:prstGeom prst="ellipse">
-            <a:avLst/>
-          </a:prstGeom>
-          <a:solidFill>
-            <a:srgbClr val="C00000"/>
-          </a:solidFill>
-          <a:ln>
-            <a:noFill/>
-          </a:ln>
-        </p:spPr>
-        <p:style>
-          <a:lnRef idx="2">
-            <a:schemeClr val="accent1">
-              <a:shade val="50000"/>
-            </a:schemeClr>
-          </a:lnRef>
-          <a:fillRef idx="1">
-            <a:schemeClr val="accent1"/>
-          </a:fillRef>
-          <a:effectRef idx="0">
-            <a:schemeClr val="accent1"/>
-          </a:effectRef>
-          <a:fontRef idx="minor">
-            <a:schemeClr val="lt1"/>
-          </a:fontRef>
-        </p:style>
-        <p:txBody>
-          <a:bodyPr rtlCol="0" anchor="ctr"/>
-          <a:lstStyle/>
-          <a:p>
-            <a:pPr algn="ctr"/>
-            <a:endParaRPr lang="en-DE"/>
-          </a:p>
-        </p:txBody>
-      </p:sp>
-      <p:sp>
-        <p:nvSpPr>
-          <p:cNvPr id="18" name="Oval 17">
-            <a:extLst>
-              <a:ext uri="{FF2B5EF4-FFF2-40B4-BE49-F238E27FC236}">
-                <a16:creationId xmlns:a16="http://schemas.microsoft.com/office/drawing/2014/main" id="{2A06960F-DF09-3041-BE0A-95CD2C0636B8}"/>
-              </a:ext>
-            </a:extLst>
-          </p:cNvPr>
-          <p:cNvSpPr/>
-          <p:nvPr/>
-        </p:nvSpPr>
-        <p:spPr>
-          <a:xfrm>
-            <a:off x="4769224" y="3191213"/>
-            <a:ext cx="753035" cy="556034"/>
-          </a:xfrm>
-          <a:prstGeom prst="ellipse">
-            <a:avLst/>
-          </a:prstGeom>
-          <a:noFill/>
-          <a:ln w="28575">
-            <a:solidFill>
-              <a:schemeClr val="tx1"/>
-            </a:solidFill>
-            <a:prstDash val="dash"/>
-          </a:ln>
-        </p:spPr>
-        <p:style>
-          <a:lnRef idx="2">
-            <a:schemeClr val="accent1">
-              <a:shade val="50000"/>
-            </a:schemeClr>
-          </a:lnRef>
-          <a:fillRef idx="1">
-            <a:schemeClr val="accent1"/>
-          </a:fillRef>
-          <a:effectRef idx="0">
-            <a:schemeClr val="accent1"/>
-          </a:effectRef>
-          <a:fontRef idx="minor">
-            <a:schemeClr val="lt1"/>
-          </a:fontRef>
-        </p:style>
-        <p:txBody>
-          <a:bodyPr rtlCol="0" anchor="ctr"/>
-          <a:lstStyle/>
-          <a:p>
-            <a:pPr algn="ctr"/>
-            <a:endParaRPr lang="en-DE"/>
-          </a:p>
-        </p:txBody>
-      </p:sp>
-      <p:sp>
-        <p:nvSpPr>
-          <p:cNvPr id="21" name="Oval 20">
-            <a:extLst>
-              <a:ext uri="{FF2B5EF4-FFF2-40B4-BE49-F238E27FC236}">
-                <a16:creationId xmlns:a16="http://schemas.microsoft.com/office/drawing/2014/main" id="{4A9FE266-B24D-604D-B71D-A9F6EA5A4D46}"/>
-              </a:ext>
-            </a:extLst>
-          </p:cNvPr>
-          <p:cNvSpPr/>
-          <p:nvPr/>
-        </p:nvSpPr>
-        <p:spPr>
-          <a:xfrm>
-            <a:off x="6233339" y="4454895"/>
-            <a:ext cx="645456" cy="417966"/>
-          </a:xfrm>
-          <a:prstGeom prst="ellipse">
-            <a:avLst/>
-          </a:prstGeom>
-          <a:noFill/>
-          <a:ln w="28575">
-            <a:solidFill>
-              <a:schemeClr val="tx1"/>
-            </a:solidFill>
-            <a:prstDash val="dash"/>
-          </a:ln>
-        </p:spPr>
-        <p:style>
-          <a:lnRef idx="2">
-            <a:schemeClr val="accent1">
-              <a:shade val="50000"/>
-            </a:schemeClr>
-          </a:lnRef>
-          <a:fillRef idx="1">
-            <a:schemeClr val="accent1"/>
-          </a:fillRef>
-          <a:effectRef idx="0">
-            <a:schemeClr val="accent1"/>
-          </a:effectRef>
-          <a:fontRef idx="minor">
-            <a:schemeClr val="lt1"/>
-          </a:fontRef>
-        </p:style>
-        <p:txBody>
-          <a:bodyPr rtlCol="0" anchor="ctr"/>
-          <a:lstStyle/>
-          <a:p>
-            <a:pPr algn="ctr"/>
-            <a:endParaRPr lang="en-DE"/>
-          </a:p>
-        </p:txBody>
-      </p:sp>
-    </p:spTree>
-    <p:extLst>
-      <p:ext uri="{BB962C8B-B14F-4D97-AF65-F5344CB8AC3E}">
-        <p14:creationId xmlns:p14="http://schemas.microsoft.com/office/powerpoint/2010/main" val="691515954"/>
-      </p:ext>
-    </p:extLst>
-  </p:cSld>
-  <p:clrMapOvr>
-    <a:masterClrMapping/>
-  </p:clrMapOvr>
-</p:sld>
-</file>
-
 <file path=ppt/slides/slide4.xml><?xml version="1.0" encoding="utf-8"?>
 <p:sld xmlns:a="http://schemas.openxmlformats.org/drawingml/2006/main" xmlns:r="http://schemas.openxmlformats.org/officeDocument/2006/relationships" xmlns:p="http://schemas.openxmlformats.org/presentationml/2006/main">
   <p:cSld>
@@ -10614,6 +11433,641 @@
           <p:cNvPr id="2" name="Title 1">
             <a:extLst>
               <a:ext uri="{FF2B5EF4-FFF2-40B4-BE49-F238E27FC236}">
+                <a16:creationId xmlns:a16="http://schemas.microsoft.com/office/drawing/2014/main" id="{14AF8AEE-3E67-F441-A4FC-33F99CD3111D}"/>
+              </a:ext>
+            </a:extLst>
+          </p:cNvPr>
+          <p:cNvSpPr>
+            <a:spLocks noGrp="1"/>
+          </p:cNvSpPr>
+          <p:nvPr>
+            <p:ph type="title"/>
+          </p:nvPr>
+        </p:nvSpPr>
+        <p:spPr/>
+        <p:txBody>
+          <a:bodyPr/>
+          <a:lstStyle/>
+          <a:p>
+            <a:r>
+              <a:rPr lang="en-DE" dirty="0"/>
+              <a:t>feature-based clustering</a:t>
+            </a:r>
+          </a:p>
+        </p:txBody>
+      </p:sp>
+      <p:cxnSp>
+        <p:nvCxnSpPr>
+          <p:cNvPr id="5" name="Straight Arrow Connector 4">
+            <a:extLst>
+              <a:ext uri="{FF2B5EF4-FFF2-40B4-BE49-F238E27FC236}">
+                <a16:creationId xmlns:a16="http://schemas.microsoft.com/office/drawing/2014/main" id="{09D1EB48-54E9-9B49-8C15-7002755E6EAE}"/>
+              </a:ext>
+            </a:extLst>
+          </p:cNvPr>
+          <p:cNvCxnSpPr>
+            <a:cxnSpLocks/>
+          </p:cNvCxnSpPr>
+          <p:nvPr/>
+        </p:nvCxnSpPr>
+        <p:spPr>
+          <a:xfrm>
+            <a:off x="4697936" y="4887988"/>
+            <a:ext cx="3070806" cy="0"/>
+          </a:xfrm>
+          <a:prstGeom prst="straightConnector1">
+            <a:avLst/>
+          </a:prstGeom>
+          <a:ln w="57150">
+            <a:tailEnd type="triangle"/>
+          </a:ln>
+        </p:spPr>
+        <p:style>
+          <a:lnRef idx="1">
+            <a:schemeClr val="accent1"/>
+          </a:lnRef>
+          <a:fillRef idx="0">
+            <a:schemeClr val="accent1"/>
+          </a:fillRef>
+          <a:effectRef idx="0">
+            <a:schemeClr val="accent1"/>
+          </a:effectRef>
+          <a:fontRef idx="minor">
+            <a:schemeClr val="tx1"/>
+          </a:fontRef>
+        </p:style>
+      </p:cxnSp>
+      <p:cxnSp>
+        <p:nvCxnSpPr>
+          <p:cNvPr id="6" name="Straight Arrow Connector 5">
+            <a:extLst>
+              <a:ext uri="{FF2B5EF4-FFF2-40B4-BE49-F238E27FC236}">
+                <a16:creationId xmlns:a16="http://schemas.microsoft.com/office/drawing/2014/main" id="{2133E6F8-C574-A847-A02C-16CAF0A4B8B6}"/>
+              </a:ext>
+            </a:extLst>
+          </p:cNvPr>
+          <p:cNvCxnSpPr>
+            <a:cxnSpLocks/>
+          </p:cNvCxnSpPr>
+          <p:nvPr/>
+        </p:nvCxnSpPr>
+        <p:spPr>
+          <a:xfrm flipV="1">
+            <a:off x="4715866" y="3006547"/>
+            <a:ext cx="0" cy="1890406"/>
+          </a:xfrm>
+          <a:prstGeom prst="straightConnector1">
+            <a:avLst/>
+          </a:prstGeom>
+          <a:ln w="57150">
+            <a:tailEnd type="triangle"/>
+          </a:ln>
+        </p:spPr>
+        <p:style>
+          <a:lnRef idx="1">
+            <a:schemeClr val="accent1"/>
+          </a:lnRef>
+          <a:fillRef idx="0">
+            <a:schemeClr val="accent1"/>
+          </a:fillRef>
+          <a:effectRef idx="0">
+            <a:schemeClr val="accent1"/>
+          </a:effectRef>
+          <a:fontRef idx="minor">
+            <a:schemeClr val="tx1"/>
+          </a:fontRef>
+        </p:style>
+      </p:cxnSp>
+      <p:sp>
+        <p:nvSpPr>
+          <p:cNvPr id="9" name="TextBox 8">
+            <a:extLst>
+              <a:ext uri="{FF2B5EF4-FFF2-40B4-BE49-F238E27FC236}">
+                <a16:creationId xmlns:a16="http://schemas.microsoft.com/office/drawing/2014/main" id="{64D1D4CC-2A42-C044-A500-B56D76DFCB94}"/>
+              </a:ext>
+            </a:extLst>
+          </p:cNvPr>
+          <p:cNvSpPr txBox="1"/>
+          <p:nvPr/>
+        </p:nvSpPr>
+        <p:spPr>
+          <a:xfrm>
+            <a:off x="3516082" y="2954586"/>
+            <a:ext cx="1024128" cy="369332"/>
+          </a:xfrm>
+          <a:prstGeom prst="rect">
+            <a:avLst/>
+          </a:prstGeom>
+          <a:noFill/>
+        </p:spPr>
+        <p:txBody>
+          <a:bodyPr wrap="square" rtlCol="0">
+            <a:spAutoFit/>
+          </a:bodyPr>
+          <a:lstStyle/>
+          <a:p>
+            <a:pPr algn="ctr"/>
+            <a:r>
+              <a:rPr lang="en-DE" dirty="0"/>
+              <a:t>entropy</a:t>
+            </a:r>
+          </a:p>
+        </p:txBody>
+      </p:sp>
+      <p:sp>
+        <p:nvSpPr>
+          <p:cNvPr id="10" name="TextBox 9">
+            <a:extLst>
+              <a:ext uri="{FF2B5EF4-FFF2-40B4-BE49-F238E27FC236}">
+                <a16:creationId xmlns:a16="http://schemas.microsoft.com/office/drawing/2014/main" id="{B5C1435A-C21F-1644-BB17-06E0045A9EB3}"/>
+              </a:ext>
+            </a:extLst>
+          </p:cNvPr>
+          <p:cNvSpPr txBox="1"/>
+          <p:nvPr/>
+        </p:nvSpPr>
+        <p:spPr>
+          <a:xfrm>
+            <a:off x="6613155" y="4970909"/>
+            <a:ext cx="1690098" cy="369332"/>
+          </a:xfrm>
+          <a:prstGeom prst="rect">
+            <a:avLst/>
+          </a:prstGeom>
+          <a:noFill/>
+        </p:spPr>
+        <p:txBody>
+          <a:bodyPr wrap="square" rtlCol="0">
+            <a:spAutoFit/>
+          </a:bodyPr>
+          <a:lstStyle/>
+          <a:p>
+            <a:pPr algn="ctr"/>
+            <a:r>
+              <a:rPr lang="en-DE" dirty="0"/>
+              <a:t>autocorrelation</a:t>
+            </a:r>
+          </a:p>
+        </p:txBody>
+      </p:sp>
+      <p:sp>
+        <p:nvSpPr>
+          <p:cNvPr id="12" name="Oval 11">
+            <a:extLst>
+              <a:ext uri="{FF2B5EF4-FFF2-40B4-BE49-F238E27FC236}">
+                <a16:creationId xmlns:a16="http://schemas.microsoft.com/office/drawing/2014/main" id="{D54DB8F5-94B6-B94B-896C-2490DAA4571E}"/>
+              </a:ext>
+            </a:extLst>
+          </p:cNvPr>
+          <p:cNvSpPr/>
+          <p:nvPr/>
+        </p:nvSpPr>
+        <p:spPr>
+          <a:xfrm>
+            <a:off x="4957483" y="3429000"/>
+            <a:ext cx="134469" cy="147912"/>
+          </a:xfrm>
+          <a:prstGeom prst="ellipse">
+            <a:avLst/>
+          </a:prstGeom>
+          <a:solidFill>
+            <a:schemeClr val="accent6">
+              <a:lumMod val="60000"/>
+              <a:lumOff val="40000"/>
+            </a:schemeClr>
+          </a:solidFill>
+          <a:ln>
+            <a:noFill/>
+          </a:ln>
+        </p:spPr>
+        <p:style>
+          <a:lnRef idx="2">
+            <a:schemeClr val="accent1">
+              <a:shade val="50000"/>
+            </a:schemeClr>
+          </a:lnRef>
+          <a:fillRef idx="1">
+            <a:schemeClr val="accent1"/>
+          </a:fillRef>
+          <a:effectRef idx="0">
+            <a:schemeClr val="accent1"/>
+          </a:effectRef>
+          <a:fontRef idx="minor">
+            <a:schemeClr val="lt1"/>
+          </a:fontRef>
+        </p:style>
+        <p:txBody>
+          <a:bodyPr rtlCol="0" anchor="ctr"/>
+          <a:lstStyle/>
+          <a:p>
+            <a:pPr algn="ctr"/>
+            <a:endParaRPr lang="en-DE"/>
+          </a:p>
+        </p:txBody>
+      </p:sp>
+      <p:sp>
+        <p:nvSpPr>
+          <p:cNvPr id="13" name="Oval 12">
+            <a:extLst>
+              <a:ext uri="{FF2B5EF4-FFF2-40B4-BE49-F238E27FC236}">
+                <a16:creationId xmlns:a16="http://schemas.microsoft.com/office/drawing/2014/main" id="{D715D40D-F94E-8848-ABF6-DD941BCE7BA3}"/>
+              </a:ext>
+            </a:extLst>
+          </p:cNvPr>
+          <p:cNvSpPr/>
+          <p:nvPr/>
+        </p:nvSpPr>
+        <p:spPr>
+          <a:xfrm>
+            <a:off x="5084676" y="3249962"/>
+            <a:ext cx="134469" cy="147912"/>
+          </a:xfrm>
+          <a:prstGeom prst="ellipse">
+            <a:avLst/>
+          </a:prstGeom>
+          <a:solidFill>
+            <a:schemeClr val="accent1"/>
+          </a:solidFill>
+          <a:ln>
+            <a:noFill/>
+          </a:ln>
+        </p:spPr>
+        <p:style>
+          <a:lnRef idx="2">
+            <a:schemeClr val="accent1">
+              <a:shade val="50000"/>
+            </a:schemeClr>
+          </a:lnRef>
+          <a:fillRef idx="1">
+            <a:schemeClr val="accent1"/>
+          </a:fillRef>
+          <a:effectRef idx="0">
+            <a:schemeClr val="accent1"/>
+          </a:effectRef>
+          <a:fontRef idx="minor">
+            <a:schemeClr val="lt1"/>
+          </a:fontRef>
+        </p:style>
+        <p:txBody>
+          <a:bodyPr rtlCol="0" anchor="ctr"/>
+          <a:lstStyle/>
+          <a:p>
+            <a:pPr algn="ctr"/>
+            <a:endParaRPr lang="en-DE"/>
+          </a:p>
+        </p:txBody>
+      </p:sp>
+      <p:sp>
+        <p:nvSpPr>
+          <p:cNvPr id="14" name="Oval 13">
+            <a:extLst>
+              <a:ext uri="{FF2B5EF4-FFF2-40B4-BE49-F238E27FC236}">
+                <a16:creationId xmlns:a16="http://schemas.microsoft.com/office/drawing/2014/main" id="{8CD2673B-F30B-C345-B900-A4168BDEBF7D}"/>
+              </a:ext>
+            </a:extLst>
+          </p:cNvPr>
+          <p:cNvSpPr/>
+          <p:nvPr/>
+        </p:nvSpPr>
+        <p:spPr>
+          <a:xfrm>
+            <a:off x="5151910" y="3453650"/>
+            <a:ext cx="134469" cy="147912"/>
+          </a:xfrm>
+          <a:prstGeom prst="ellipse">
+            <a:avLst/>
+          </a:prstGeom>
+          <a:solidFill>
+            <a:schemeClr val="accent2"/>
+          </a:solidFill>
+          <a:ln>
+            <a:noFill/>
+          </a:ln>
+        </p:spPr>
+        <p:style>
+          <a:lnRef idx="2">
+            <a:schemeClr val="accent1">
+              <a:shade val="50000"/>
+            </a:schemeClr>
+          </a:lnRef>
+          <a:fillRef idx="1">
+            <a:schemeClr val="accent1"/>
+          </a:fillRef>
+          <a:effectRef idx="0">
+            <a:schemeClr val="accent1"/>
+          </a:effectRef>
+          <a:fontRef idx="minor">
+            <a:schemeClr val="lt1"/>
+          </a:fontRef>
+        </p:style>
+        <p:txBody>
+          <a:bodyPr rtlCol="0" anchor="ctr"/>
+          <a:lstStyle/>
+          <a:p>
+            <a:pPr algn="ctr"/>
+            <a:endParaRPr lang="en-DE"/>
+          </a:p>
+        </p:txBody>
+      </p:sp>
+      <p:sp>
+        <p:nvSpPr>
+          <p:cNvPr id="15" name="Oval 14">
+            <a:extLst>
+              <a:ext uri="{FF2B5EF4-FFF2-40B4-BE49-F238E27FC236}">
+                <a16:creationId xmlns:a16="http://schemas.microsoft.com/office/drawing/2014/main" id="{E11A33F2-13C1-C642-80BC-F0F8B6C491DB}"/>
+              </a:ext>
+            </a:extLst>
+          </p:cNvPr>
+          <p:cNvSpPr/>
+          <p:nvPr/>
+        </p:nvSpPr>
+        <p:spPr>
+          <a:xfrm>
+            <a:off x="6478686" y="4515966"/>
+            <a:ext cx="134469" cy="147912"/>
+          </a:xfrm>
+          <a:prstGeom prst="ellipse">
+            <a:avLst/>
+          </a:prstGeom>
+          <a:solidFill>
+            <a:schemeClr val="accent4">
+              <a:lumMod val="50000"/>
+            </a:schemeClr>
+          </a:solidFill>
+          <a:ln>
+            <a:noFill/>
+          </a:ln>
+        </p:spPr>
+        <p:style>
+          <a:lnRef idx="2">
+            <a:schemeClr val="accent1">
+              <a:shade val="50000"/>
+            </a:schemeClr>
+          </a:lnRef>
+          <a:fillRef idx="1">
+            <a:schemeClr val="accent1"/>
+          </a:fillRef>
+          <a:effectRef idx="0">
+            <a:schemeClr val="accent1"/>
+          </a:effectRef>
+          <a:fontRef idx="minor">
+            <a:schemeClr val="lt1"/>
+          </a:fontRef>
+        </p:style>
+        <p:txBody>
+          <a:bodyPr rtlCol="0" anchor="ctr"/>
+          <a:lstStyle/>
+          <a:p>
+            <a:pPr algn="ctr"/>
+            <a:endParaRPr lang="en-DE"/>
+          </a:p>
+        </p:txBody>
+      </p:sp>
+      <p:sp>
+        <p:nvSpPr>
+          <p:cNvPr id="16" name="Oval 15">
+            <a:extLst>
+              <a:ext uri="{FF2B5EF4-FFF2-40B4-BE49-F238E27FC236}">
+                <a16:creationId xmlns:a16="http://schemas.microsoft.com/office/drawing/2014/main" id="{474D6E04-3164-904A-9F5D-2A2E30279849}"/>
+              </a:ext>
+            </a:extLst>
+          </p:cNvPr>
+          <p:cNvSpPr/>
+          <p:nvPr/>
+        </p:nvSpPr>
+        <p:spPr>
+          <a:xfrm>
+            <a:off x="6344217" y="4663878"/>
+            <a:ext cx="134469" cy="147912"/>
+          </a:xfrm>
+          <a:prstGeom prst="ellipse">
+            <a:avLst/>
+          </a:prstGeom>
+          <a:solidFill>
+            <a:srgbClr val="7030A0"/>
+          </a:solidFill>
+          <a:ln>
+            <a:noFill/>
+          </a:ln>
+        </p:spPr>
+        <p:style>
+          <a:lnRef idx="2">
+            <a:schemeClr val="accent1">
+              <a:shade val="50000"/>
+            </a:schemeClr>
+          </a:lnRef>
+          <a:fillRef idx="1">
+            <a:schemeClr val="accent1"/>
+          </a:fillRef>
+          <a:effectRef idx="0">
+            <a:schemeClr val="accent1"/>
+          </a:effectRef>
+          <a:fontRef idx="minor">
+            <a:schemeClr val="lt1"/>
+          </a:fontRef>
+        </p:style>
+        <p:txBody>
+          <a:bodyPr rtlCol="0" anchor="ctr"/>
+          <a:lstStyle/>
+          <a:p>
+            <a:pPr algn="ctr"/>
+            <a:endParaRPr lang="en-DE"/>
+          </a:p>
+        </p:txBody>
+      </p:sp>
+      <p:sp>
+        <p:nvSpPr>
+          <p:cNvPr id="17" name="Oval 16">
+            <a:extLst>
+              <a:ext uri="{FF2B5EF4-FFF2-40B4-BE49-F238E27FC236}">
+                <a16:creationId xmlns:a16="http://schemas.microsoft.com/office/drawing/2014/main" id="{1539A826-2EAB-8640-9DFD-1C7AC8A40AFC}"/>
+              </a:ext>
+            </a:extLst>
+          </p:cNvPr>
+          <p:cNvSpPr/>
+          <p:nvPr/>
+        </p:nvSpPr>
+        <p:spPr>
+          <a:xfrm>
+            <a:off x="6680389" y="4589922"/>
+            <a:ext cx="134469" cy="147912"/>
+          </a:xfrm>
+          <a:prstGeom prst="ellipse">
+            <a:avLst/>
+          </a:prstGeom>
+          <a:solidFill>
+            <a:srgbClr val="C00000"/>
+          </a:solidFill>
+          <a:ln>
+            <a:noFill/>
+          </a:ln>
+        </p:spPr>
+        <p:style>
+          <a:lnRef idx="2">
+            <a:schemeClr val="accent1">
+              <a:shade val="50000"/>
+            </a:schemeClr>
+          </a:lnRef>
+          <a:fillRef idx="1">
+            <a:schemeClr val="accent1"/>
+          </a:fillRef>
+          <a:effectRef idx="0">
+            <a:schemeClr val="accent1"/>
+          </a:effectRef>
+          <a:fontRef idx="minor">
+            <a:schemeClr val="lt1"/>
+          </a:fontRef>
+        </p:style>
+        <p:txBody>
+          <a:bodyPr rtlCol="0" anchor="ctr"/>
+          <a:lstStyle/>
+          <a:p>
+            <a:pPr algn="ctr"/>
+            <a:endParaRPr lang="en-DE"/>
+          </a:p>
+        </p:txBody>
+      </p:sp>
+      <p:sp>
+        <p:nvSpPr>
+          <p:cNvPr id="18" name="Oval 17">
+            <a:extLst>
+              <a:ext uri="{FF2B5EF4-FFF2-40B4-BE49-F238E27FC236}">
+                <a16:creationId xmlns:a16="http://schemas.microsoft.com/office/drawing/2014/main" id="{2A06960F-DF09-3041-BE0A-95CD2C0636B8}"/>
+              </a:ext>
+            </a:extLst>
+          </p:cNvPr>
+          <p:cNvSpPr/>
+          <p:nvPr/>
+        </p:nvSpPr>
+        <p:spPr>
+          <a:xfrm>
+            <a:off x="4769224" y="3191213"/>
+            <a:ext cx="753035" cy="556034"/>
+          </a:xfrm>
+          <a:prstGeom prst="ellipse">
+            <a:avLst/>
+          </a:prstGeom>
+          <a:noFill/>
+          <a:ln w="28575">
+            <a:solidFill>
+              <a:schemeClr val="tx1"/>
+            </a:solidFill>
+            <a:prstDash val="dash"/>
+          </a:ln>
+        </p:spPr>
+        <p:style>
+          <a:lnRef idx="2">
+            <a:schemeClr val="accent1">
+              <a:shade val="50000"/>
+            </a:schemeClr>
+          </a:lnRef>
+          <a:fillRef idx="1">
+            <a:schemeClr val="accent1"/>
+          </a:fillRef>
+          <a:effectRef idx="0">
+            <a:schemeClr val="accent1"/>
+          </a:effectRef>
+          <a:fontRef idx="minor">
+            <a:schemeClr val="lt1"/>
+          </a:fontRef>
+        </p:style>
+        <p:txBody>
+          <a:bodyPr rtlCol="0" anchor="ctr"/>
+          <a:lstStyle/>
+          <a:p>
+            <a:pPr algn="ctr"/>
+            <a:endParaRPr lang="en-DE"/>
+          </a:p>
+        </p:txBody>
+      </p:sp>
+      <p:sp>
+        <p:nvSpPr>
+          <p:cNvPr id="21" name="Oval 20">
+            <a:extLst>
+              <a:ext uri="{FF2B5EF4-FFF2-40B4-BE49-F238E27FC236}">
+                <a16:creationId xmlns:a16="http://schemas.microsoft.com/office/drawing/2014/main" id="{4A9FE266-B24D-604D-B71D-A9F6EA5A4D46}"/>
+              </a:ext>
+            </a:extLst>
+          </p:cNvPr>
+          <p:cNvSpPr/>
+          <p:nvPr/>
+        </p:nvSpPr>
+        <p:spPr>
+          <a:xfrm>
+            <a:off x="6233339" y="4454895"/>
+            <a:ext cx="645456" cy="417966"/>
+          </a:xfrm>
+          <a:prstGeom prst="ellipse">
+            <a:avLst/>
+          </a:prstGeom>
+          <a:noFill/>
+          <a:ln w="28575">
+            <a:solidFill>
+              <a:schemeClr val="tx1"/>
+            </a:solidFill>
+            <a:prstDash val="dash"/>
+          </a:ln>
+        </p:spPr>
+        <p:style>
+          <a:lnRef idx="2">
+            <a:schemeClr val="accent1">
+              <a:shade val="50000"/>
+            </a:schemeClr>
+          </a:lnRef>
+          <a:fillRef idx="1">
+            <a:schemeClr val="accent1"/>
+          </a:fillRef>
+          <a:effectRef idx="0">
+            <a:schemeClr val="accent1"/>
+          </a:effectRef>
+          <a:fontRef idx="minor">
+            <a:schemeClr val="lt1"/>
+          </a:fontRef>
+        </p:style>
+        <p:txBody>
+          <a:bodyPr rtlCol="0" anchor="ctr"/>
+          <a:lstStyle/>
+          <a:p>
+            <a:pPr algn="ctr"/>
+            <a:endParaRPr lang="en-DE"/>
+          </a:p>
+        </p:txBody>
+      </p:sp>
+    </p:spTree>
+    <p:extLst>
+      <p:ext uri="{BB962C8B-B14F-4D97-AF65-F5344CB8AC3E}">
+        <p14:creationId xmlns:p14="http://schemas.microsoft.com/office/powerpoint/2010/main" val="691515954"/>
+      </p:ext>
+    </p:extLst>
+  </p:cSld>
+  <p:clrMapOvr>
+    <a:masterClrMapping/>
+  </p:clrMapOvr>
+</p:sld>
+</file>
+
+<file path=ppt/slides/slide5.xml><?xml version="1.0" encoding="utf-8"?>
+<p:sld xmlns:a="http://schemas.openxmlformats.org/drawingml/2006/main" xmlns:r="http://schemas.openxmlformats.org/officeDocument/2006/relationships" xmlns:p="http://schemas.openxmlformats.org/presentationml/2006/main">
+  <p:cSld>
+    <p:spTree>
+      <p:nvGrpSpPr>
+        <p:cNvPr id="1" name=""/>
+        <p:cNvGrpSpPr/>
+        <p:nvPr/>
+      </p:nvGrpSpPr>
+      <p:grpSpPr>
+        <a:xfrm>
+          <a:off x="0" y="0"/>
+          <a:ext cx="0" cy="0"/>
+          <a:chOff x="0" y="0"/>
+          <a:chExt cx="0" cy="0"/>
+        </a:xfrm>
+      </p:grpSpPr>
+      <p:sp>
+        <p:nvSpPr>
+          <p:cNvPr id="2" name="Title 1">
+            <a:extLst>
+              <a:ext uri="{FF2B5EF4-FFF2-40B4-BE49-F238E27FC236}">
                 <a16:creationId xmlns:a16="http://schemas.microsoft.com/office/drawing/2014/main" id="{E4A93472-CD1E-E84D-8A8F-56F2016C3667}"/>
               </a:ext>
             </a:extLst>
@@ -27868,7 +29322,7 @@
 </p:sld>
 </file>
 
-<file path=ppt/slides/slide5.xml><?xml version="1.0" encoding="utf-8"?>
+<file path=ppt/slides/slide6.xml><?xml version="1.0" encoding="utf-8"?>
 <p:sld xmlns:a="http://schemas.openxmlformats.org/drawingml/2006/main" xmlns:r="http://schemas.openxmlformats.org/officeDocument/2006/relationships" xmlns:p="http://schemas.openxmlformats.org/presentationml/2006/main">
   <p:cSld>
     <p:spTree>
@@ -32050,7 +33504,7 @@
 </p:sld>
 </file>
 
-<file path=ppt/slides/slide6.xml><?xml version="1.0" encoding="utf-8"?>
+<file path=ppt/slides/slide7.xml><?xml version="1.0" encoding="utf-8"?>
 <p:sld xmlns:a="http://schemas.openxmlformats.org/drawingml/2006/main" xmlns:r="http://schemas.openxmlformats.org/officeDocument/2006/relationships" xmlns:p="http://schemas.openxmlformats.org/presentationml/2006/main">
   <p:cSld>
     <p:spTree>

</xml_diff>